<commit_message>
Update new files Also Gorkem's code
</commit_message>
<xml_diff>
--- a/final_report/datasets/PMHD_Leo_Ermi.pptx
+++ b/final_report/datasets/PMHD_Leo_Ermi.pptx
@@ -5,7 +5,7 @@
     <p:sldMasterId id="2147483648" r:id="rId1"/>
   </p:sldMasterIdLst>
   <p:notesMasterIdLst>
-    <p:notesMasterId r:id="rId10"/>
+    <p:notesMasterId r:id="rId12"/>
   </p:notesMasterIdLst>
   <p:sldIdLst>
     <p:sldId id="256" r:id="rId2"/>
@@ -14,8 +14,10 @@
     <p:sldId id="287" r:id="rId5"/>
     <p:sldId id="288" r:id="rId6"/>
     <p:sldId id="289" r:id="rId7"/>
-    <p:sldId id="291" r:id="rId8"/>
-    <p:sldId id="290" r:id="rId9"/>
+    <p:sldId id="292" r:id="rId8"/>
+    <p:sldId id="293" r:id="rId9"/>
+    <p:sldId id="291" r:id="rId10"/>
+    <p:sldId id="290" r:id="rId11"/>
   </p:sldIdLst>
   <p:sldSz cx="12192000" cy="6858000"/>
   <p:notesSz cx="6858000" cy="9144000"/>
@@ -145,6 +147,7 @@
 
 <file path=ppt/authors.xml><?xml version="1.0" encoding="utf-8"?>
 <p188:authorLst xmlns:a="http://schemas.openxmlformats.org/drawingml/2006/main" xmlns:r="http://schemas.openxmlformats.org/officeDocument/2006/relationships" xmlns:p188="http://schemas.microsoft.com/office/powerpoint/2018/8/main">
+  <p188:author id="{0C36AEF3-7FBC-6E48-FD09-88C9D6B7629B}" name="Gastbenutzer" initials="Ga" userId="S::urn:spo:anon#5c64dec115ca0f4fc742d59b5dd30c785a9ce29f50dfeae3a0d9bf9834ab07e0::" providerId="AD"/>
   <p188:author id="{CC9CCCFB-7D02-9C8C-4C68-2A993E04BBD6}" name="My Luong Vuong" initials="MLV" userId="S::myluong.vuong@kuleuven.be::3a095926-c094-4dc5-9520-da494b4df4d0" providerId="AD"/>
 </p188:authorLst>
 </file>
@@ -152,7 +155,9 @@
 <file path=ppt/revisionInfo.xml><?xml version="1.0" encoding="utf-8"?>
 <p1510:revInfo xmlns:a="http://schemas.openxmlformats.org/drawingml/2006/main" xmlns:r="http://schemas.openxmlformats.org/officeDocument/2006/relationships" xmlns:p1510="http://schemas.microsoft.com/office/powerpoint/2015/10/main">
   <p1510:revLst>
-    <p1510:client id="{F5DEC93E-52AB-44AA-9768-80C89EE50BD4}" v="28" dt="2024-05-05T16:36:08.617"/>
+    <p1510:client id="{5991A54F-BF8C-8D2B-B09D-7E8BDCF74F94}" v="1" vWet="2" dt="2024-05-06T17:35:15.248"/>
+    <p1510:client id="{61E7938E-F6C8-D7C1-893A-A5D814113370}" v="190" dt="2024-05-06T17:32:09.730"/>
+    <p1510:client id="{F5DEC93E-52AB-44AA-9768-80C89EE50BD4}" v="90" dt="2024-05-06T17:40:35.476"/>
   </p1510:revLst>
 </p1510:revInfo>
 </file>
@@ -160,9 +165,259 @@
 <file path=ppt/changesInfos/changesInfo1.xml><?xml version="1.0" encoding="utf-8"?>
 <pc:chgInfo xmlns:a="http://schemas.openxmlformats.org/drawingml/2006/main" xmlns:r="http://schemas.openxmlformats.org/officeDocument/2006/relationships" xmlns:ac="http://schemas.microsoft.com/office/drawing/2013/main/command" xmlns:pc="http://schemas.microsoft.com/office/powerpoint/2013/main/command">
   <pc:docChgLst>
+    <pc:chgData name="Gastbenutzer" userId="S::urn:spo:anon#5c64dec115ca0f4fc742d59b5dd30c785a9ce29f50dfeae3a0d9bf9834ab07e0::" providerId="AD" clId="Web-{61E7938E-F6C8-D7C1-893A-A5D814113370}"/>
+    <pc:docChg chg="mod addSld modSld">
+      <pc:chgData name="Gastbenutzer" userId="S::urn:spo:anon#5c64dec115ca0f4fc742d59b5dd30c785a9ce29f50dfeae3a0d9bf9834ab07e0::" providerId="AD" clId="Web-{61E7938E-F6C8-D7C1-893A-A5D814113370}" dt="2024-05-06T17:32:09.730" v="114"/>
+      <pc:docMkLst>
+        <pc:docMk/>
+      </pc:docMkLst>
+      <pc:sldChg chg="modSp">
+        <pc:chgData name="Gastbenutzer" userId="S::urn:spo:anon#5c64dec115ca0f4fc742d59b5dd30c785a9ce29f50dfeae3a0d9bf9834ab07e0::" providerId="AD" clId="Web-{61E7938E-F6C8-D7C1-893A-A5D814113370}" dt="2024-05-06T16:47:58.424" v="50" actId="20577"/>
+        <pc:sldMkLst>
+          <pc:docMk/>
+          <pc:sldMk cId="1172306395" sldId="273"/>
+        </pc:sldMkLst>
+        <pc:spChg chg="mod">
+          <ac:chgData name="Gastbenutzer" userId="S::urn:spo:anon#5c64dec115ca0f4fc742d59b5dd30c785a9ce29f50dfeae3a0d9bf9834ab07e0::" providerId="AD" clId="Web-{61E7938E-F6C8-D7C1-893A-A5D814113370}" dt="2024-05-06T16:47:58.424" v="50" actId="20577"/>
+          <ac:spMkLst>
+            <pc:docMk/>
+            <pc:sldMk cId="1172306395" sldId="273"/>
+            <ac:spMk id="10" creationId="{F43D7CB2-ABA9-892F-FFA7-BA3FC2244A1B}"/>
+          </ac:spMkLst>
+        </pc:spChg>
+      </pc:sldChg>
+      <pc:sldChg chg="addSp delSp modSp addCm modCm">
+        <pc:chgData name="Gastbenutzer" userId="S::urn:spo:anon#5c64dec115ca0f4fc742d59b5dd30c785a9ce29f50dfeae3a0d9bf9834ab07e0::" providerId="AD" clId="Web-{61E7938E-F6C8-D7C1-893A-A5D814113370}" dt="2024-05-06T17:32:09.730" v="114"/>
+        <pc:sldMkLst>
+          <pc:docMk/>
+          <pc:sldMk cId="1784963950" sldId="287"/>
+        </pc:sldMkLst>
+        <pc:spChg chg="add del mod">
+          <ac:chgData name="Gastbenutzer" userId="S::urn:spo:anon#5c64dec115ca0f4fc742d59b5dd30c785a9ce29f50dfeae3a0d9bf9834ab07e0::" providerId="AD" clId="Web-{61E7938E-F6C8-D7C1-893A-A5D814113370}" dt="2024-05-06T17:32:09.730" v="114"/>
+          <ac:spMkLst>
+            <pc:docMk/>
+            <pc:sldMk cId="1784963950" sldId="287"/>
+            <ac:spMk id="2" creationId="{F650A50C-76C6-0B97-3DAB-86E7DB181D75}"/>
+          </ac:spMkLst>
+        </pc:spChg>
+        <pc:extLst>
+          <p:ext xmlns:p="http://schemas.openxmlformats.org/presentationml/2006/main" uri="{D6D511B9-2390-475A-947B-AFAB55BFBCF1}">
+            <pc226:cmChg xmlns:pc226="http://schemas.microsoft.com/office/powerpoint/2022/06/main/command" chg="add mod">
+              <pc226:chgData name="Gastbenutzer" userId="S::urn:spo:anon#5c64dec115ca0f4fc742d59b5dd30c785a9ce29f50dfeae3a0d9bf9834ab07e0::" providerId="AD" clId="Web-{61E7938E-F6C8-D7C1-893A-A5D814113370}" dt="2024-05-06T16:52:34.326" v="54"/>
+              <pc2:cmMkLst xmlns:pc2="http://schemas.microsoft.com/office/powerpoint/2019/9/main/command">
+                <pc:docMk/>
+                <pc:sldMk cId="1784963950" sldId="287"/>
+                <pc2:cmMk id="{85934584-EEFF-4851-B0F3-06B3C14F34F5}"/>
+              </pc2:cmMkLst>
+            </pc226:cmChg>
+          </p:ext>
+        </pc:extLst>
+      </pc:sldChg>
+      <pc:sldChg chg="modSp">
+        <pc:chgData name="Gastbenutzer" userId="S::urn:spo:anon#5c64dec115ca0f4fc742d59b5dd30c785a9ce29f50dfeae3a0d9bf9834ab07e0::" providerId="AD" clId="Web-{61E7938E-F6C8-D7C1-893A-A5D814113370}" dt="2024-05-06T17:27:06.672" v="101" actId="20577"/>
+        <pc:sldMkLst>
+          <pc:docMk/>
+          <pc:sldMk cId="1306253517" sldId="288"/>
+        </pc:sldMkLst>
+        <pc:spChg chg="mod">
+          <ac:chgData name="Gastbenutzer" userId="S::urn:spo:anon#5c64dec115ca0f4fc742d59b5dd30c785a9ce29f50dfeae3a0d9bf9834ab07e0::" providerId="AD" clId="Web-{61E7938E-F6C8-D7C1-893A-A5D814113370}" dt="2024-05-06T17:27:06.672" v="101" actId="20577"/>
+          <ac:spMkLst>
+            <pc:docMk/>
+            <pc:sldMk cId="1306253517" sldId="288"/>
+            <ac:spMk id="2" creationId="{F667BA87-7007-ED5B-D062-C25FA220CDA6}"/>
+          </ac:spMkLst>
+        </pc:spChg>
+      </pc:sldChg>
+      <pc:sldChg chg="addCm">
+        <pc:chgData name="Gastbenutzer" userId="S::urn:spo:anon#5c64dec115ca0f4fc742d59b5dd30c785a9ce29f50dfeae3a0d9bf9834ab07e0::" providerId="AD" clId="Web-{61E7938E-F6C8-D7C1-893A-A5D814113370}" dt="2024-05-06T16:54:44.815" v="55"/>
+        <pc:sldMkLst>
+          <pc:docMk/>
+          <pc:sldMk cId="1512697662" sldId="289"/>
+        </pc:sldMkLst>
+        <pc:extLst>
+          <p:ext xmlns:p="http://schemas.openxmlformats.org/presentationml/2006/main" uri="{D6D511B9-2390-475A-947B-AFAB55BFBCF1}">
+            <pc226:cmChg xmlns:pc226="http://schemas.microsoft.com/office/powerpoint/2022/06/main/command" chg="add">
+              <pc226:chgData name="Gastbenutzer" userId="S::urn:spo:anon#5c64dec115ca0f4fc742d59b5dd30c785a9ce29f50dfeae3a0d9bf9834ab07e0::" providerId="AD" clId="Web-{61E7938E-F6C8-D7C1-893A-A5D814113370}" dt="2024-05-06T16:54:44.815" v="55"/>
+              <pc2:cmMkLst xmlns:pc2="http://schemas.microsoft.com/office/powerpoint/2019/9/main/command">
+                <pc:docMk/>
+                <pc:sldMk cId="1512697662" sldId="289"/>
+                <pc2:cmMk id="{76A79D56-30A0-4116-93FB-ECB0FE2581D2}"/>
+              </pc2:cmMkLst>
+            </pc226:cmChg>
+          </p:ext>
+        </pc:extLst>
+      </pc:sldChg>
+      <pc:sldChg chg="addCm">
+        <pc:chgData name="Gastbenutzer" userId="S::urn:spo:anon#5c64dec115ca0f4fc742d59b5dd30c785a9ce29f50dfeae3a0d9bf9834ab07e0::" providerId="AD" clId="Web-{61E7938E-F6C8-D7C1-893A-A5D814113370}" dt="2024-05-06T16:57:10.321" v="56"/>
+        <pc:sldMkLst>
+          <pc:docMk/>
+          <pc:sldMk cId="63958657" sldId="291"/>
+        </pc:sldMkLst>
+        <pc:extLst>
+          <p:ext xmlns:p="http://schemas.openxmlformats.org/presentationml/2006/main" uri="{D6D511B9-2390-475A-947B-AFAB55BFBCF1}">
+            <pc226:cmChg xmlns:pc226="http://schemas.microsoft.com/office/powerpoint/2022/06/main/command" chg="add">
+              <pc226:chgData name="Gastbenutzer" userId="S::urn:spo:anon#5c64dec115ca0f4fc742d59b5dd30c785a9ce29f50dfeae3a0d9bf9834ab07e0::" providerId="AD" clId="Web-{61E7938E-F6C8-D7C1-893A-A5D814113370}" dt="2024-05-06T16:57:10.321" v="56"/>
+              <pc2:cmMkLst xmlns:pc2="http://schemas.microsoft.com/office/powerpoint/2019/9/main/command">
+                <pc:docMk/>
+                <pc:sldMk cId="63958657" sldId="291"/>
+                <pc2:cmMk id="{794D53D6-C60F-48F6-B0EC-A90939FEA578}"/>
+              </pc2:cmMkLst>
+            </pc226:cmChg>
+          </p:ext>
+        </pc:extLst>
+      </pc:sldChg>
+      <pc:sldChg chg="addSp delSp modSp new">
+        <pc:chgData name="Gastbenutzer" userId="S::urn:spo:anon#5c64dec115ca0f4fc742d59b5dd30c785a9ce29f50dfeae3a0d9bf9834ab07e0::" providerId="AD" clId="Web-{61E7938E-F6C8-D7C1-893A-A5D814113370}" dt="2024-05-06T15:31:59.968" v="6" actId="1076"/>
+        <pc:sldMkLst>
+          <pc:docMk/>
+          <pc:sldMk cId="3573558212" sldId="292"/>
+        </pc:sldMkLst>
+        <pc:spChg chg="del">
+          <ac:chgData name="Gastbenutzer" userId="S::urn:spo:anon#5c64dec115ca0f4fc742d59b5dd30c785a9ce29f50dfeae3a0d9bf9834ab07e0::" providerId="AD" clId="Web-{61E7938E-F6C8-D7C1-893A-A5D814113370}" dt="2024-05-06T15:29:35.979" v="2"/>
+          <ac:spMkLst>
+            <pc:docMk/>
+            <pc:sldMk cId="3573558212" sldId="292"/>
+            <ac:spMk id="2" creationId="{8997F46C-3D23-7116-CDF4-E3F3BC803346}"/>
+          </ac:spMkLst>
+        </pc:spChg>
+        <pc:spChg chg="del">
+          <ac:chgData name="Gastbenutzer" userId="S::urn:spo:anon#5c64dec115ca0f4fc742d59b5dd30c785a9ce29f50dfeae3a0d9bf9834ab07e0::" providerId="AD" clId="Web-{61E7938E-F6C8-D7C1-893A-A5D814113370}" dt="2024-05-06T15:31:49.718" v="3"/>
+          <ac:spMkLst>
+            <pc:docMk/>
+            <pc:sldMk cId="3573558212" sldId="292"/>
+            <ac:spMk id="3" creationId="{5D5B04CD-C2F3-7DB9-1AE4-A7861B41F718}"/>
+          </ac:spMkLst>
+        </pc:spChg>
+        <pc:spChg chg="add">
+          <ac:chgData name="Gastbenutzer" userId="S::urn:spo:anon#5c64dec115ca0f4fc742d59b5dd30c785a9ce29f50dfeae3a0d9bf9834ab07e0::" providerId="AD" clId="Web-{61E7938E-F6C8-D7C1-893A-A5D814113370}" dt="2024-05-06T15:29:31.948" v="1"/>
+          <ac:spMkLst>
+            <pc:docMk/>
+            <pc:sldMk cId="3573558212" sldId="292"/>
+            <ac:spMk id="6" creationId="{0457BC2A-1CEE-D81F-531E-2106B4E4706E}"/>
+          </ac:spMkLst>
+        </pc:spChg>
+        <pc:picChg chg="add mod ord">
+          <ac:chgData name="Gastbenutzer" userId="S::urn:spo:anon#5c64dec115ca0f4fc742d59b5dd30c785a9ce29f50dfeae3a0d9bf9834ab07e0::" providerId="AD" clId="Web-{61E7938E-F6C8-D7C1-893A-A5D814113370}" dt="2024-05-06T15:31:59.968" v="6" actId="1076"/>
+          <ac:picMkLst>
+            <pc:docMk/>
+            <pc:sldMk cId="3573558212" sldId="292"/>
+            <ac:picMk id="7" creationId="{90AEAA7C-493B-91F4-23A0-6590DE146975}"/>
+          </ac:picMkLst>
+        </pc:picChg>
+      </pc:sldChg>
+      <pc:sldChg chg="addSp delSp modSp add mod replId setBg">
+        <pc:chgData name="Gastbenutzer" userId="S::urn:spo:anon#5c64dec115ca0f4fc742d59b5dd30c785a9ce29f50dfeae3a0d9bf9834ab07e0::" providerId="AD" clId="Web-{61E7938E-F6C8-D7C1-893A-A5D814113370}" dt="2024-05-06T15:33:48.378" v="48" actId="14100"/>
+        <pc:sldMkLst>
+          <pc:docMk/>
+          <pc:sldMk cId="1864710421" sldId="293"/>
+        </pc:sldMkLst>
+        <pc:spChg chg="add del mod">
+          <ac:chgData name="Gastbenutzer" userId="S::urn:spo:anon#5c64dec115ca0f4fc742d59b5dd30c785a9ce29f50dfeae3a0d9bf9834ab07e0::" providerId="AD" clId="Web-{61E7938E-F6C8-D7C1-893A-A5D814113370}" dt="2024-05-06T15:32:21.688" v="9"/>
+          <ac:spMkLst>
+            <pc:docMk/>
+            <pc:sldMk cId="1864710421" sldId="293"/>
+            <ac:spMk id="3" creationId="{FEF1DC87-530F-12EE-19E7-4286D55441D1}"/>
+          </ac:spMkLst>
+        </pc:spChg>
+        <pc:spChg chg="mod ord">
+          <ac:chgData name="Gastbenutzer" userId="S::urn:spo:anon#5c64dec115ca0f4fc742d59b5dd30c785a9ce29f50dfeae3a0d9bf9834ab07e0::" providerId="AD" clId="Web-{61E7938E-F6C8-D7C1-893A-A5D814113370}" dt="2024-05-06T15:32:33.657" v="12"/>
+          <ac:spMkLst>
+            <pc:docMk/>
+            <pc:sldMk cId="1864710421" sldId="293"/>
+            <ac:spMk id="4" creationId="{82E4413C-5766-9580-B444-D0658DCDEC3F}"/>
+          </ac:spMkLst>
+        </pc:spChg>
+        <pc:spChg chg="del mod">
+          <ac:chgData name="Gastbenutzer" userId="S::urn:spo:anon#5c64dec115ca0f4fc742d59b5dd30c785a9ce29f50dfeae3a0d9bf9834ab07e0::" providerId="AD" clId="Web-{61E7938E-F6C8-D7C1-893A-A5D814113370}" dt="2024-05-06T15:32:38.813" v="13"/>
+          <ac:spMkLst>
+            <pc:docMk/>
+            <pc:sldMk cId="1864710421" sldId="293"/>
+            <ac:spMk id="6" creationId="{0457BC2A-1CEE-D81F-531E-2106B4E4706E}"/>
+          </ac:spMkLst>
+        </pc:spChg>
+        <pc:spChg chg="add">
+          <ac:chgData name="Gastbenutzer" userId="S::urn:spo:anon#5c64dec115ca0f4fc742d59b5dd30c785a9ce29f50dfeae3a0d9bf9834ab07e0::" providerId="AD" clId="Web-{61E7938E-F6C8-D7C1-893A-A5D814113370}" dt="2024-05-06T15:32:46.126" v="14"/>
+          <ac:spMkLst>
+            <pc:docMk/>
+            <pc:sldMk cId="1864710421" sldId="293"/>
+            <ac:spMk id="10" creationId="{58F69662-6571-7F51-A62C-3E39CD20CB3B}"/>
+          </ac:spMkLst>
+        </pc:spChg>
+        <pc:spChg chg="add mod">
+          <ac:chgData name="Gastbenutzer" userId="S::urn:spo:anon#5c64dec115ca0f4fc742d59b5dd30c785a9ce29f50dfeae3a0d9bf9834ab07e0::" providerId="AD" clId="Web-{61E7938E-F6C8-D7C1-893A-A5D814113370}" dt="2024-05-06T15:33:48.378" v="48" actId="14100"/>
+          <ac:spMkLst>
+            <pc:docMk/>
+            <pc:sldMk cId="1864710421" sldId="293"/>
+            <ac:spMk id="11" creationId="{EE9B3275-6AFE-903C-9B23-45A50856A79B}"/>
+          </ac:spMkLst>
+        </pc:spChg>
+        <pc:spChg chg="add">
+          <ac:chgData name="Gastbenutzer" userId="S::urn:spo:anon#5c64dec115ca0f4fc742d59b5dd30c785a9ce29f50dfeae3a0d9bf9834ab07e0::" providerId="AD" clId="Web-{61E7938E-F6C8-D7C1-893A-A5D814113370}" dt="2024-05-06T15:32:33.657" v="12"/>
+          <ac:spMkLst>
+            <pc:docMk/>
+            <pc:sldMk cId="1864710421" sldId="293"/>
+            <ac:spMk id="13" creationId="{99ED5833-B85B-4103-8A3B-CAB0308E6C15}"/>
+          </ac:spMkLst>
+        </pc:spChg>
+        <pc:picChg chg="add mod ord">
+          <ac:chgData name="Gastbenutzer" userId="S::urn:spo:anon#5c64dec115ca0f4fc742d59b5dd30c785a9ce29f50dfeae3a0d9bf9834ab07e0::" providerId="AD" clId="Web-{61E7938E-F6C8-D7C1-893A-A5D814113370}" dt="2024-05-06T15:32:33.657" v="12"/>
+          <ac:picMkLst>
+            <pc:docMk/>
+            <pc:sldMk cId="1864710421" sldId="293"/>
+            <ac:picMk id="5" creationId="{C4DB9C3A-28DB-F680-C386-88D2BA50ABBB}"/>
+          </ac:picMkLst>
+        </pc:picChg>
+        <pc:picChg chg="del">
+          <ac:chgData name="Gastbenutzer" userId="S::urn:spo:anon#5c64dec115ca0f4fc742d59b5dd30c785a9ce29f50dfeae3a0d9bf9834ab07e0::" providerId="AD" clId="Web-{61E7938E-F6C8-D7C1-893A-A5D814113370}" dt="2024-05-06T15:32:17.735" v="8"/>
+          <ac:picMkLst>
+            <pc:docMk/>
+            <pc:sldMk cId="1864710421" sldId="293"/>
+            <ac:picMk id="7" creationId="{90AEAA7C-493B-91F4-23A0-6590DE146975}"/>
+          </ac:picMkLst>
+        </pc:picChg>
+        <pc:picChg chg="add mod">
+          <ac:chgData name="Gastbenutzer" userId="S::urn:spo:anon#5c64dec115ca0f4fc742d59b5dd30c785a9ce29f50dfeae3a0d9bf9834ab07e0::" providerId="AD" clId="Web-{61E7938E-F6C8-D7C1-893A-A5D814113370}" dt="2024-05-06T15:32:33.657" v="12"/>
+          <ac:picMkLst>
+            <pc:docMk/>
+            <pc:sldMk cId="1864710421" sldId="293"/>
+            <ac:picMk id="8" creationId="{3555ED38-2194-590D-CEE8-9FD375BD9248}"/>
+          </ac:picMkLst>
+        </pc:picChg>
+      </pc:sldChg>
+    </pc:docChg>
+  </pc:docChgLst>
+  <pc:docChgLst>
+    <pc:chgData name="Gastbenutzer" userId="S::urn:spo:anon#5c64dec115ca0f4fc742d59b5dd30c785a9ce29f50dfeae3a0d9bf9834ab07e0::" providerId="AD" clId="Web-{5991A54F-BF8C-8D2B-B09D-7E8BDCF74F94}"/>
+    <pc:docChg chg="modSld">
+      <pc:chgData name="Gastbenutzer" userId="S::urn:spo:anon#5c64dec115ca0f4fc742d59b5dd30c785a9ce29f50dfeae3a0d9bf9834ab07e0::" providerId="AD" clId="Web-{5991A54F-BF8C-8D2B-B09D-7E8BDCF74F94}" dt="2024-05-06T17:35:08.810" v="18"/>
+      <pc:docMkLst>
+        <pc:docMk/>
+      </pc:docMkLst>
+      <pc:sldChg chg="delCm modNotes">
+        <pc:chgData name="Gastbenutzer" userId="S::urn:spo:anon#5c64dec115ca0f4fc742d59b5dd30c785a9ce29f50dfeae3a0d9bf9834ab07e0::" providerId="AD" clId="Web-{5991A54F-BF8C-8D2B-B09D-7E8BDCF74F94}" dt="2024-05-06T17:35:08.810" v="18"/>
+        <pc:sldMkLst>
+          <pc:docMk/>
+          <pc:sldMk cId="1784963950" sldId="287"/>
+        </pc:sldMkLst>
+        <pc:extLst>
+          <p:ext xmlns:p="http://schemas.openxmlformats.org/presentationml/2006/main" uri="{D6D511B9-2390-475A-947B-AFAB55BFBCF1}">
+            <pc226:cmChg xmlns:pc226="http://schemas.microsoft.com/office/powerpoint/2022/06/main/command" chg="del">
+              <pc226:chgData name="Gastbenutzer" userId="S::urn:spo:anon#5c64dec115ca0f4fc742d59b5dd30c785a9ce29f50dfeae3a0d9bf9834ab07e0::" providerId="AD" clId="Web-{5991A54F-BF8C-8D2B-B09D-7E8BDCF74F94}" dt="2024-05-06T17:33:56.495" v="0"/>
+              <pc2:cmMkLst xmlns:pc2="http://schemas.microsoft.com/office/powerpoint/2019/9/main/command">
+                <pc:docMk/>
+                <pc:sldMk cId="1784963950" sldId="287"/>
+                <pc2:cmMk id="{85934584-EEFF-4851-B0F3-06B3C14F34F5}"/>
+              </pc2:cmMkLst>
+            </pc226:cmChg>
+          </p:ext>
+        </pc:extLst>
+      </pc:sldChg>
+    </pc:docChg>
+  </pc:docChgLst>
+  <pc:docChgLst>
     <pc:chgData name="My Luong Vuong" userId="3a095926-c094-4dc5-9520-da494b4df4d0" providerId="ADAL" clId="{F5DEC93E-52AB-44AA-9768-80C89EE50BD4}"/>
     <pc:docChg chg="undo custSel addSld delSld modSld">
-      <pc:chgData name="My Luong Vuong" userId="3a095926-c094-4dc5-9520-da494b4df4d0" providerId="ADAL" clId="{F5DEC93E-52AB-44AA-9768-80C89EE50BD4}" dt="2024-05-05T16:36:27.688" v="1175" actId="555"/>
+      <pc:chgData name="My Luong Vuong" userId="3a095926-c094-4dc5-9520-da494b4df4d0" providerId="ADAL" clId="{F5DEC93E-52AB-44AA-9768-80C89EE50BD4}" dt="2024-05-06T17:40:35.476" v="1234" actId="20577"/>
       <pc:docMkLst>
         <pc:docMk/>
       </pc:docMkLst>
@@ -778,13 +1033,13 @@
         </pc:sldMkLst>
       </pc:sldChg>
       <pc:sldChg chg="addSp delSp modSp add mod">
-        <pc:chgData name="My Luong Vuong" userId="3a095926-c094-4dc5-9520-da494b4df4d0" providerId="ADAL" clId="{F5DEC93E-52AB-44AA-9768-80C89EE50BD4}" dt="2024-05-05T16:25:16.637" v="683" actId="12788"/>
+        <pc:chgData name="My Luong Vuong" userId="3a095926-c094-4dc5-9520-da494b4df4d0" providerId="ADAL" clId="{F5DEC93E-52AB-44AA-9768-80C89EE50BD4}" dt="2024-05-06T17:40:35.476" v="1234" actId="20577"/>
         <pc:sldMkLst>
           <pc:docMk/>
           <pc:sldMk cId="1784963950" sldId="287"/>
         </pc:sldMkLst>
         <pc:spChg chg="add mod">
-          <ac:chgData name="My Luong Vuong" userId="3a095926-c094-4dc5-9520-da494b4df4d0" providerId="ADAL" clId="{F5DEC93E-52AB-44AA-9768-80C89EE50BD4}" dt="2024-05-05T16:25:16.637" v="683" actId="12788"/>
+          <ac:chgData name="My Luong Vuong" userId="3a095926-c094-4dc5-9520-da494b4df4d0" providerId="ADAL" clId="{F5DEC93E-52AB-44AA-9768-80C89EE50BD4}" dt="2024-05-06T17:40:35.476" v="1234" actId="20577"/>
           <ac:spMkLst>
             <pc:docMk/>
             <pc:sldMk cId="1784963950" sldId="287"/>
@@ -991,6 +1246,48 @@
     </pc:docChg>
   </pc:docChgLst>
 </pc:chgInfo>
+</file>
+
+<file path=ppt/comments/modernComment_121_5A29EF3E.xml><?xml version="1.0" encoding="utf-8"?>
+<p188:cmLst xmlns:a="http://schemas.openxmlformats.org/drawingml/2006/main" xmlns:r="http://schemas.openxmlformats.org/officeDocument/2006/relationships" xmlns:p188="http://schemas.microsoft.com/office/powerpoint/2018/8/main">
+  <p188:cm id="{76A79D56-30A0-4116-93FB-ECB0FE2581D2}" authorId="{0C36AEF3-7FBC-6E48-FD09-88C9D6B7629B}" created="2024-05-06T16:54:44.815">
+    <pc:sldMkLst xmlns:pc="http://schemas.microsoft.com/office/powerpoint/2013/main/command">
+      <pc:docMk/>
+      <pc:sldMk cId="1512697662" sldId="289"/>
+    </pc:sldMkLst>
+    <p188:txBody>
+      <a:bodyPr/>
+      <a:lstStyle/>
+      <a:p>
+        <a:r>
+          <a:rPr lang="de-DE"/>
+          <a:t>I am afraid the plot is not really informative in that format - maybe lets try to rescale it so the slopes have more space?</a:t>
+        </a:r>
+      </a:p>
+    </p188:txBody>
+  </p188:cm>
+</p188:cmLst>
+</file>
+
+<file path=ppt/comments/modernComment_123_3CFEE81.xml><?xml version="1.0" encoding="utf-8"?>
+<p188:cmLst xmlns:a="http://schemas.openxmlformats.org/drawingml/2006/main" xmlns:r="http://schemas.openxmlformats.org/officeDocument/2006/relationships" xmlns:p188="http://schemas.microsoft.com/office/powerpoint/2018/8/main">
+  <p188:cm id="{794D53D6-C60F-48F6-B0EC-A90939FEA578}" authorId="{0C36AEF3-7FBC-6E48-FD09-88C9D6B7629B}" created="2024-05-06T16:57:10.321">
+    <pc:sldMkLst xmlns:pc="http://schemas.microsoft.com/office/powerpoint/2013/main/command">
+      <pc:docMk/>
+      <pc:sldMk cId="63958657" sldId="291"/>
+    </pc:sldMkLst>
+    <p188:txBody>
+      <a:bodyPr/>
+      <a:lstStyle/>
+      <a:p>
+        <a:r>
+          <a:rPr lang="de-DE"/>
+          <a:t>What is the benefit of running a pca on the time variable? dimensionality reduction is not typically used for repeated measurements, or am I wrong?</a:t>
+        </a:r>
+      </a:p>
+    </p188:txBody>
+  </p188:cm>
+</p188:cmLst>
 </file>
 
 <file path=ppt/notesMasters/notesMaster1.xml><?xml version="1.0" encoding="utf-8"?>
@@ -1075,7 +1372,7 @@
           <a:p>
             <a:fld id="{FEDBB8FC-F675-4390-BBE1-0E341717A941}" type="datetimeFigureOut">
               <a:rPr lang="en-GB" smtClean="0"/>
-              <a:t>05/05/2024</a:t>
+              <a:t>06/05/2024</a:t>
             </a:fld>
             <a:endParaRPr lang="en-GB"/>
           </a:p>
@@ -1404,7 +1701,7 @@
               <a:tabLst/>
               <a:defRPr/>
             </a:pPr>
-            <a:endParaRPr lang="en-GB" dirty="0"/>
+            <a:endParaRPr lang="en-GB"/>
           </a:p>
         </p:txBody>
       </p:sp>
@@ -1489,7 +1786,7 @@
           <a:lstStyle/>
           <a:p>
             <a:pPr algn="l"/>
-            <a:endParaRPr lang="en-GB" dirty="0"/>
+            <a:endParaRPr lang="en-GB"/>
           </a:p>
         </p:txBody>
       </p:sp>
@@ -1573,8 +1870,13 @@
           <a:bodyPr/>
           <a:lstStyle/>
           <a:p>
-            <a:pPr algn="l"/>
-            <a:endParaRPr lang="en-GB" dirty="0"/>
+            <a:r>
+              <a:rPr lang="en-GB">
+                <a:cs typeface="Calibri"/>
+              </a:rPr>
+              <a:t>Add interaction effect time*compound</a:t>
+            </a:r>
+            <a:endParaRPr lang="en-GB"/>
           </a:p>
         </p:txBody>
       </p:sp>
@@ -1659,7 +1961,7 @@
           <a:lstStyle/>
           <a:p>
             <a:pPr algn="l"/>
-            <a:endParaRPr lang="en-GB" dirty="0"/>
+            <a:endParaRPr lang="en-GB"/>
           </a:p>
         </p:txBody>
       </p:sp>
@@ -1744,7 +2046,7 @@
           <a:lstStyle/>
           <a:p>
             <a:pPr algn="l"/>
-            <a:endParaRPr lang="en-GB" dirty="0"/>
+            <a:endParaRPr lang="en-GB"/>
           </a:p>
         </p:txBody>
       </p:sp>
@@ -1829,7 +2131,7 @@
           <a:lstStyle/>
           <a:p>
             <a:pPr algn="l"/>
-            <a:endParaRPr lang="en-GB" dirty="0"/>
+            <a:endParaRPr lang="en-GB"/>
           </a:p>
         </p:txBody>
       </p:sp>
@@ -1850,7 +2152,7 @@
           <a:p>
             <a:fld id="{F3C73E64-794F-4ECA-A98B-4BD9407CB764}" type="slidenum">
               <a:rPr lang="en-GB" smtClean="0"/>
-              <a:t>7</a:t>
+              <a:t>9</a:t>
             </a:fld>
             <a:endParaRPr lang="en-GB"/>
           </a:p>
@@ -1914,7 +2216,7 @@
           <a:lstStyle/>
           <a:p>
             <a:pPr algn="l"/>
-            <a:endParaRPr lang="en-GB" dirty="0"/>
+            <a:endParaRPr lang="en-GB"/>
           </a:p>
         </p:txBody>
       </p:sp>
@@ -1935,7 +2237,7 @@
           <a:p>
             <a:fld id="{F3C73E64-794F-4ECA-A98B-4BD9407CB764}" type="slidenum">
               <a:rPr lang="en-GB" smtClean="0"/>
-              <a:t>8</a:t>
+              <a:t>10</a:t>
             </a:fld>
             <a:endParaRPr lang="en-GB"/>
           </a:p>
@@ -2103,7 +2405,7 @@
           <a:p>
             <a:fld id="{80FE467B-BA3B-475B-9EDB-328FD5B6601B}" type="datetime1">
               <a:rPr lang="en-GB" smtClean="0"/>
-              <a:t>05/05/2024</a:t>
+              <a:t>06/05/2024</a:t>
             </a:fld>
             <a:endParaRPr lang="en-GB"/>
           </a:p>
@@ -2319,7 +2621,7 @@
           <a:p>
             <a:fld id="{8317617B-60C6-4059-B766-A0B145D7C6CA}" type="datetime1">
               <a:rPr lang="en-GB" smtClean="0"/>
-              <a:t>05/05/2024</a:t>
+              <a:t>06/05/2024</a:t>
             </a:fld>
             <a:endParaRPr lang="en-GB"/>
           </a:p>
@@ -2529,7 +2831,7 @@
           <a:p>
             <a:fld id="{6BE1F5C4-4FB7-426C-8671-D0B7B19634EA}" type="datetime1">
               <a:rPr lang="en-GB" smtClean="0"/>
-              <a:t>05/05/2024</a:t>
+              <a:t>06/05/2024</a:t>
             </a:fld>
             <a:endParaRPr lang="en-GB"/>
           </a:p>
@@ -2729,7 +3031,7 @@
           <a:p>
             <a:fld id="{696506C0-D54E-4F9C-8B1E-E8FABFDF21D0}" type="datetime1">
               <a:rPr lang="en-GB" smtClean="0"/>
-              <a:t>05/05/2024</a:t>
+              <a:t>06/05/2024</a:t>
             </a:fld>
             <a:endParaRPr lang="en-GB"/>
           </a:p>
@@ -3021,7 +3323,7 @@
           <a:p>
             <a:fld id="{B29CF08F-2D02-47D7-A693-72F567259DA0}" type="datetime1">
               <a:rPr lang="en-GB" smtClean="0"/>
-              <a:t>05/05/2024</a:t>
+              <a:t>06/05/2024</a:t>
             </a:fld>
             <a:endParaRPr lang="en-GB"/>
           </a:p>
@@ -3289,7 +3591,7 @@
           <a:p>
             <a:fld id="{03F73064-AA92-462A-B652-1C2B2250EDA3}" type="datetime1">
               <a:rPr lang="en-GB" smtClean="0"/>
-              <a:t>05/05/2024</a:t>
+              <a:t>06/05/2024</a:t>
             </a:fld>
             <a:endParaRPr lang="en-GB"/>
           </a:p>
@@ -3704,7 +4006,7 @@
           <a:p>
             <a:fld id="{ABB3B46A-F9B4-422D-A949-5742D9D28E82}" type="datetime1">
               <a:rPr lang="en-GB" smtClean="0"/>
-              <a:t>05/05/2024</a:t>
+              <a:t>06/05/2024</a:t>
             </a:fld>
             <a:endParaRPr lang="en-GB"/>
           </a:p>
@@ -3846,7 +4148,7 @@
           <a:p>
             <a:fld id="{B7ABC97A-66FF-4CDA-8A77-F5AFA9BF259E}" type="datetime1">
               <a:rPr lang="en-GB" smtClean="0"/>
-              <a:t>05/05/2024</a:t>
+              <a:t>06/05/2024</a:t>
             </a:fld>
             <a:endParaRPr lang="en-GB"/>
           </a:p>
@@ -3959,7 +4261,7 @@
           <a:p>
             <a:fld id="{ECD21A1E-101F-4CCC-9748-0780BCD8C3F7}" type="datetime1">
               <a:rPr lang="en-GB" smtClean="0"/>
-              <a:t>05/05/2024</a:t>
+              <a:t>06/05/2024</a:t>
             </a:fld>
             <a:endParaRPr lang="en-GB"/>
           </a:p>
@@ -4272,7 +4574,7 @@
           <a:p>
             <a:fld id="{8BEDA984-8BC5-44A2-833E-0FAFCC43E8C1}" type="datetime1">
               <a:rPr lang="en-GB" smtClean="0"/>
-              <a:t>05/05/2024</a:t>
+              <a:t>06/05/2024</a:t>
             </a:fld>
             <a:endParaRPr lang="en-GB"/>
           </a:p>
@@ -4561,7 +4863,7 @@
           <a:p>
             <a:fld id="{EA0A98BD-ED1C-4547-BBF3-BBDE0597D3A1}" type="datetime1">
               <a:rPr lang="en-GB" smtClean="0"/>
-              <a:t>05/05/2024</a:t>
+              <a:t>06/05/2024</a:t>
             </a:fld>
             <a:endParaRPr lang="en-GB"/>
           </a:p>
@@ -4804,7 +5106,7 @@
           <a:p>
             <a:fld id="{633690CF-AD31-4956-A775-170A747E3477}" type="datetime1">
               <a:rPr lang="en-GB" smtClean="0"/>
-              <a:t>05/05/2024</a:t>
+              <a:t>06/05/2024</a:t>
             </a:fld>
             <a:endParaRPr lang="en-GB"/>
           </a:p>
@@ -4893,7 +5195,7 @@
           </a:lstStyle>
           <a:p>
             <a:r>
-              <a:rPr lang="en-GB" dirty="0"/>
+              <a:rPr lang="en-GB"/>
               <a:t>Slide number</a:t>
             </a:r>
           </a:p>
@@ -5286,25 +5588,25 @@
             <a:lstStyle/>
             <a:p>
               <a:br>
-                <a:rPr lang="en-US" dirty="0">
+                <a:rPr lang="en-US">
                   <a:latin typeface="Arial" panose="020B0604020202020204" pitchFamily="34" charset="0"/>
                   <a:cs typeface="Arial" panose="020B0604020202020204" pitchFamily="34" charset="0"/>
                 </a:rPr>
               </a:br>
               <a:r>
-                <a:rPr lang="en-US" sz="3200" b="1" dirty="0">
+                <a:rPr lang="en-US" sz="3200" b="1">
                   <a:latin typeface="Arial" panose="020B0604020202020204" pitchFamily="34" charset="0"/>
                   <a:cs typeface="Arial" panose="020B0604020202020204" pitchFamily="34" charset="0"/>
                 </a:rPr>
                 <a:t>PMHD final assignment</a:t>
               </a:r>
-              <a:endParaRPr lang="en-US" b="1" dirty="0">
+              <a:endParaRPr lang="en-US" b="1">
                 <a:latin typeface="Arial" panose="020B0604020202020204" pitchFamily="34" charset="0"/>
                 <a:cs typeface="Arial" panose="020B0604020202020204" pitchFamily="34" charset="0"/>
               </a:endParaRPr>
             </a:p>
             <a:p>
-              <a:endParaRPr lang="en-GB" dirty="0">
+              <a:endParaRPr lang="en-GB">
                 <a:latin typeface="Arial" panose="020B0604020202020204" pitchFamily="34" charset="0"/>
                 <a:cs typeface="Arial" panose="020B0604020202020204" pitchFamily="34" charset="0"/>
               </a:endParaRPr>
@@ -5339,7 +5641,7 @@
             </a:bodyPr>
             <a:lstStyle/>
             <a:p>
-              <a:endParaRPr lang="en-GB" sz="2400" dirty="0"/>
+              <a:endParaRPr lang="en-GB" sz="2400"/>
             </a:p>
           </p:txBody>
         </p:sp>
@@ -5371,7 +5673,7 @@
             </a:bodyPr>
             <a:lstStyle/>
             <a:p>
-              <a:endParaRPr lang="en-GB" sz="1600" dirty="0"/>
+              <a:endParaRPr lang="en-GB" sz="1600"/>
             </a:p>
           </p:txBody>
         </p:sp>
@@ -5405,14 +5707,14 @@
           <a:lstStyle/>
           <a:p>
             <a:r>
-              <a:rPr lang="en-US" sz="2000" dirty="0" err="1">
+              <a:rPr lang="en-US" sz="2000" err="1">
                 <a:latin typeface="Arial" panose="020B0604020202020204" pitchFamily="34" charset="0"/>
                 <a:cs typeface="Arial" panose="020B0604020202020204" pitchFamily="34" charset="0"/>
               </a:rPr>
               <a:t>Ermi</a:t>
             </a:r>
             <a:r>
-              <a:rPr lang="en-US" sz="2000" dirty="0">
+              <a:rPr lang="en-US" sz="2000">
                 <a:latin typeface="Arial" panose="020B0604020202020204" pitchFamily="34" charset="0"/>
                 <a:cs typeface="Arial" panose="020B0604020202020204" pitchFamily="34" charset="0"/>
               </a:rPr>
@@ -5425,6 +5727,116 @@
     <p:extLst>
       <p:ext uri="{BB962C8B-B14F-4D97-AF65-F5344CB8AC3E}">
         <p14:creationId xmlns:p14="http://schemas.microsoft.com/office/powerpoint/2010/main" val="3978951870"/>
+      </p:ext>
+    </p:extLst>
+  </p:cSld>
+  <p:clrMapOvr>
+    <a:masterClrMapping/>
+  </p:clrMapOvr>
+</p:sld>
+</file>
+
+<file path=ppt/slides/slide10.xml><?xml version="1.0" encoding="utf-8"?>
+<p:sld xmlns:a="http://schemas.openxmlformats.org/drawingml/2006/main" xmlns:r="http://schemas.openxmlformats.org/officeDocument/2006/relationships" xmlns:p="http://schemas.openxmlformats.org/presentationml/2006/main">
+  <p:cSld>
+    <p:spTree>
+      <p:nvGrpSpPr>
+        <p:cNvPr id="1" name=""/>
+        <p:cNvGrpSpPr/>
+        <p:nvPr/>
+      </p:nvGrpSpPr>
+      <p:grpSpPr>
+        <a:xfrm>
+          <a:off x="0" y="0"/>
+          <a:ext cx="0" cy="0"/>
+          <a:chOff x="0" y="0"/>
+          <a:chExt cx="0" cy="0"/>
+        </a:xfrm>
+      </p:grpSpPr>
+      <p:sp>
+        <p:nvSpPr>
+          <p:cNvPr id="4" name="TextBox 3">
+            <a:extLst>
+              <a:ext uri="{FF2B5EF4-FFF2-40B4-BE49-F238E27FC236}">
+                <a16:creationId xmlns:a16="http://schemas.microsoft.com/office/drawing/2014/main" id="{C33C1ABC-6DBF-68C2-375E-7D9D853BD9CF}"/>
+              </a:ext>
+            </a:extLst>
+          </p:cNvPr>
+          <p:cNvSpPr txBox="1"/>
+          <p:nvPr/>
+        </p:nvSpPr>
+        <p:spPr>
+          <a:xfrm>
+            <a:off x="274714" y="336893"/>
+            <a:ext cx="12077020" cy="584775"/>
+          </a:xfrm>
+          <a:prstGeom prst="rect">
+            <a:avLst/>
+          </a:prstGeom>
+          <a:noFill/>
+        </p:spPr>
+        <p:txBody>
+          <a:bodyPr wrap="square" rtlCol="0">
+            <a:spAutoFit/>
+          </a:bodyPr>
+          <a:lstStyle/>
+          <a:p>
+            <a:r>
+              <a:rPr lang="en-GB" sz="3200">
+                <a:solidFill>
+                  <a:srgbClr val="231F20"/>
+                </a:solidFill>
+                <a:latin typeface="Arial" panose="020B0604020202020204" pitchFamily="34" charset="0"/>
+                <a:cs typeface="Arial" panose="020B0604020202020204" pitchFamily="34" charset="0"/>
+              </a:rPr>
+              <a:t>Question c – PCA. Scree plot</a:t>
+            </a:r>
+            <a:endParaRPr lang="en-GB" sz="3200"/>
+          </a:p>
+        </p:txBody>
+      </p:sp>
+      <p:pic>
+        <p:nvPicPr>
+          <p:cNvPr id="7" name="Graphic 6">
+            <a:extLst>
+              <a:ext uri="{FF2B5EF4-FFF2-40B4-BE49-F238E27FC236}">
+                <a16:creationId xmlns:a16="http://schemas.microsoft.com/office/drawing/2014/main" id="{5EECB1C0-0A3C-C9CC-ADF5-50FBE27B6049}"/>
+              </a:ext>
+            </a:extLst>
+          </p:cNvPr>
+          <p:cNvPicPr>
+            <a:picLocks noChangeAspect="1"/>
+          </p:cNvPicPr>
+          <p:nvPr/>
+        </p:nvPicPr>
+        <p:blipFill>
+          <a:blip r:embed="rId3">
+            <a:extLst>
+              <a:ext uri="{28A0092B-C50C-407E-A947-70E740481C1C}">
+                <a14:useLocalDpi xmlns:a14="http://schemas.microsoft.com/office/drawing/2010/main" val="0"/>
+              </a:ext>
+              <a:ext uri="{96DAC541-7B7A-43D3-8B79-37D633B846F1}">
+                <asvg:svgBlip xmlns:asvg="http://schemas.microsoft.com/office/drawing/2016/SVG/main" r:embed="rId4"/>
+              </a:ext>
+            </a:extLst>
+          </a:blip>
+          <a:srcRect/>
+          <a:stretch/>
+        </p:blipFill>
+        <p:spPr>
+          <a:xfrm>
+            <a:off x="1817185" y="1232373"/>
+            <a:ext cx="8557627" cy="5625626"/>
+          </a:xfrm>
+          <a:prstGeom prst="rect">
+            <a:avLst/>
+          </a:prstGeom>
+        </p:spPr>
+      </p:pic>
+    </p:spTree>
+    <p:extLst>
+      <p:ext uri="{BB962C8B-B14F-4D97-AF65-F5344CB8AC3E}">
+        <p14:creationId xmlns:p14="http://schemas.microsoft.com/office/powerpoint/2010/main" val="2024622321"/>
       </p:ext>
     </p:extLst>
   </p:cSld>
@@ -5480,7 +5892,7 @@
           <a:lstStyle/>
           <a:p>
             <a:r>
-              <a:rPr lang="en-US" sz="3200" dirty="0">
+              <a:rPr lang="en-US" sz="3200">
                 <a:solidFill>
                   <a:srgbClr val="231F20"/>
                 </a:solidFill>
@@ -5571,7 +5983,7 @@
           <a:p>
             <a:pPr algn="ctr"/>
             <a:r>
-              <a:rPr lang="en-US" sz="2800" dirty="0">
+              <a:rPr lang="en-US" sz="2800">
                 <a:solidFill>
                   <a:schemeClr val="bg1"/>
                 </a:solidFill>
@@ -5580,7 +5992,7 @@
               </a:rPr>
               <a:t>a</a:t>
             </a:r>
-            <a:endParaRPr lang="en-GB" sz="2800" dirty="0">
+            <a:endParaRPr lang="en-GB" sz="2800">
               <a:solidFill>
                 <a:schemeClr val="bg1"/>
               </a:solidFill>
@@ -5611,66 +6023,61 @@
           <a:noFill/>
         </p:spPr>
         <p:txBody>
-          <a:bodyPr wrap="square" rtlCol="0">
+          <a:bodyPr wrap="square" lIns="91440" tIns="45720" rIns="91440" bIns="45720" rtlCol="0" anchor="t">
             <a:spAutoFit/>
           </a:bodyPr>
           <a:lstStyle/>
           <a:p>
             <a:r>
-              <a:rPr lang="en-GB" sz="3200" dirty="0">
+              <a:rPr lang="en-GB" sz="3200">
                 <a:solidFill>
                   <a:srgbClr val="116E8A"/>
                 </a:solidFill>
-                <a:latin typeface="Arial" panose="020B0604020202020204" pitchFamily="34" charset="0"/>
-                <a:cs typeface="Arial" panose="020B0604020202020204" pitchFamily="34" charset="0"/>
+                <a:latin typeface="Arial"/>
+                <a:cs typeface="Arial"/>
               </a:rPr>
               <a:t>Transform the non-Gaussian outcome ‘</a:t>
             </a:r>
             <a:r>
-              <a:rPr lang="en-GB" sz="3200" dirty="0" err="1">
+              <a:rPr lang="en-GB" sz="3200" err="1">
                 <a:solidFill>
                   <a:srgbClr val="116E8A"/>
                 </a:solidFill>
-                <a:latin typeface="Arial" panose="020B0604020202020204" pitchFamily="34" charset="0"/>
-                <a:cs typeface="Arial" panose="020B0604020202020204" pitchFamily="34" charset="0"/>
+                <a:latin typeface="Arial"/>
+                <a:cs typeface="Arial"/>
               </a:rPr>
               <a:t>tot.vase.days</a:t>
             </a:r>
             <a:r>
-              <a:rPr lang="en-GB" sz="3200" dirty="0">
+              <a:rPr lang="en-GB" sz="3200">
                 <a:solidFill>
                   <a:srgbClr val="116E8A"/>
                 </a:solidFill>
-                <a:latin typeface="Arial" panose="020B0604020202020204" pitchFamily="34" charset="0"/>
-                <a:cs typeface="Arial" panose="020B0604020202020204" pitchFamily="34" charset="0"/>
+                <a:latin typeface="Arial"/>
+                <a:cs typeface="Arial"/>
               </a:rPr>
               <a:t>’ into a longitudinal binary outcome (i.e. fresh=1/not fresh=0), and </a:t>
             </a:r>
             <a:r>
-              <a:rPr lang="en-GB" sz="3200" dirty="0" err="1">
+              <a:rPr lang="en-GB" sz="3200" err="1">
                 <a:solidFill>
                   <a:srgbClr val="116E8A"/>
                 </a:solidFill>
-                <a:latin typeface="Arial" panose="020B0604020202020204" pitchFamily="34" charset="0"/>
-                <a:cs typeface="Arial" panose="020B0604020202020204" pitchFamily="34" charset="0"/>
+                <a:latin typeface="Arial"/>
+                <a:cs typeface="Arial"/>
               </a:rPr>
               <a:t>analyze</a:t>
             </a:r>
             <a:r>
-              <a:rPr lang="en-GB" sz="3200" dirty="0">
+              <a:rPr lang="en-GB" sz="3200">
                 <a:solidFill>
                   <a:srgbClr val="116E8A"/>
                 </a:solidFill>
-                <a:latin typeface="Arial" panose="020B0604020202020204" pitchFamily="34" charset="0"/>
-                <a:cs typeface="Arial" panose="020B0604020202020204" pitchFamily="34" charset="0"/>
+                <a:latin typeface="Arial"/>
+                <a:cs typeface="Arial"/>
               </a:rPr>
-              <a:t> the data taking into account the available covariates.</a:t>
-            </a:r>
-            <a:endParaRPr lang="en-GB" sz="3200" dirty="0">
-              <a:solidFill>
-                <a:srgbClr val="116E8A"/>
-              </a:solidFill>
-            </a:endParaRPr>
+              <a:t> the data taking into account the available covariates</a:t>
+            </a:r>
           </a:p>
         </p:txBody>
       </p:sp>
@@ -5719,7 +6126,7 @@
           <a:lstStyle/>
           <a:p>
             <a:pPr algn="ctr"/>
-            <a:endParaRPr lang="en-GB" dirty="0"/>
+            <a:endParaRPr lang="en-GB"/>
           </a:p>
         </p:txBody>
       </p:sp>
@@ -5752,7 +6159,7 @@
           <a:lstStyle/>
           <a:p>
             <a:r>
-              <a:rPr lang="en-GB" sz="3200" dirty="0">
+              <a:rPr lang="en-GB" sz="3200">
                 <a:solidFill>
                   <a:srgbClr val="116E8A"/>
                 </a:solidFill>
@@ -5794,7 +6201,7 @@
           <a:p>
             <a:pPr algn="ctr"/>
             <a:r>
-              <a:rPr lang="en-US" sz="2800" dirty="0">
+              <a:rPr lang="en-US" sz="2800">
                 <a:solidFill>
                   <a:schemeClr val="bg1"/>
                 </a:solidFill>
@@ -5803,7 +6210,7 @@
               </a:rPr>
               <a:t>c</a:t>
             </a:r>
-            <a:endParaRPr lang="en-GB" sz="2800" dirty="0">
+            <a:endParaRPr lang="en-GB" sz="2800">
               <a:solidFill>
                 <a:schemeClr val="bg1"/>
               </a:solidFill>
@@ -5841,13 +6248,13 @@
           <a:p>
             <a:pPr algn="r"/>
             <a:r>
-              <a:rPr lang="en-US" sz="2000" dirty="0">
+              <a:rPr lang="en-US" sz="2000">
                 <a:latin typeface="Arial" panose="020B0604020202020204" pitchFamily="34" charset="0"/>
                 <a:cs typeface="Arial" panose="020B0604020202020204" pitchFamily="34" charset="0"/>
               </a:rPr>
               <a:t>3</a:t>
             </a:r>
-            <a:endParaRPr lang="en-GB" sz="2000" dirty="0"/>
+            <a:endParaRPr lang="en-GB" sz="2000"/>
           </a:p>
         </p:txBody>
       </p:sp>
@@ -5910,7 +6317,7 @@
           <a:lstStyle/>
           <a:p>
             <a:r>
-              <a:rPr lang="en-GB" sz="3200" dirty="0">
+              <a:rPr lang="en-GB" sz="3200">
                 <a:solidFill>
                   <a:srgbClr val="231F20"/>
                 </a:solidFill>
@@ -5919,7 +6326,7 @@
               </a:rPr>
               <a:t>Question a – model selection</a:t>
             </a:r>
-            <a:endParaRPr lang="en-GB" sz="3200" dirty="0"/>
+            <a:endParaRPr lang="en-GB" sz="3200"/>
           </a:p>
         </p:txBody>
       </p:sp>
@@ -5956,7 +6363,7 @@
               <a:buChar char="•"/>
             </a:pPr>
             <a:r>
-              <a:rPr lang="en-GB" sz="3200" dirty="0">
+              <a:rPr lang="en-GB" sz="3200">
                 <a:solidFill>
                   <a:srgbClr val="116E8A"/>
                 </a:solidFill>
@@ -5965,7 +6372,7 @@
               </a:rPr>
               <a:t>Binary response: fresh (yes/no) </a:t>
             </a:r>
-            <a:endParaRPr lang="en-GB" sz="3200" dirty="0">
+            <a:endParaRPr lang="en-GB" sz="3200">
               <a:solidFill>
                 <a:srgbClr val="116E8A"/>
               </a:solidFill>
@@ -6006,7 +6413,7 @@
               <a:buChar char="•"/>
             </a:pPr>
             <a:r>
-              <a:rPr lang="en-GB" sz="3200" dirty="0">
+              <a:rPr lang="en-GB" sz="3200">
                 <a:solidFill>
                   <a:srgbClr val="116E8A"/>
                 </a:solidFill>
@@ -6015,7 +6422,7 @@
               </a:rPr>
               <a:t>Longitudinal outcome: each flower is measured repeatedly over 30 days -&gt; need to consider clustering.</a:t>
             </a:r>
-            <a:endParaRPr lang="en-GB" sz="3200" dirty="0">
+            <a:endParaRPr lang="en-GB" sz="3200">
               <a:solidFill>
                 <a:srgbClr val="116E8A"/>
               </a:solidFill>
@@ -6056,7 +6463,7 @@
               <a:buChar char="•"/>
             </a:pPr>
             <a:r>
-              <a:rPr lang="en-US" sz="3200" dirty="0">
+              <a:rPr lang="en-US" sz="3200">
                 <a:solidFill>
                   <a:srgbClr val="116E8A"/>
                 </a:solidFill>
@@ -6065,7 +6472,7 @@
               </a:rPr>
               <a:t>Research question: what are the compounds that can improve the probability that flowers stay fresh?</a:t>
             </a:r>
-            <a:endParaRPr lang="en-GB" sz="3200" dirty="0">
+            <a:endParaRPr lang="en-GB" sz="3200">
               <a:solidFill>
                 <a:srgbClr val="116E8A"/>
               </a:solidFill>
@@ -6106,7 +6513,7 @@
               <a:buChar char="•"/>
             </a:pPr>
             <a:r>
-              <a:rPr lang="en-US" sz="3200" dirty="0">
+              <a:rPr lang="en-US" sz="3200">
                 <a:solidFill>
                   <a:srgbClr val="116E8A"/>
                 </a:solidFill>
@@ -6115,7 +6522,7 @@
               </a:rPr>
               <a:t>Besides, we are asked to consider available covariates</a:t>
             </a:r>
-            <a:endParaRPr lang="en-GB" sz="3200" dirty="0">
+            <a:endParaRPr lang="en-GB" sz="3200">
               <a:solidFill>
                 <a:srgbClr val="116E8A"/>
               </a:solidFill>
@@ -6152,7 +6559,7 @@
           <a:lstStyle/>
           <a:p>
             <a:r>
-              <a:rPr lang="en-US" sz="3200" dirty="0">
+              <a:rPr lang="en-US" sz="3200">
                 <a:solidFill>
                   <a:srgbClr val="116E8A"/>
                 </a:solidFill>
@@ -6162,7 +6569,7 @@
               <a:t>-&gt; Select: GEE – generalized estimating equation, group by </a:t>
             </a:r>
             <a:r>
-              <a:rPr lang="en-US" sz="3200" dirty="0" err="1">
+              <a:rPr lang="en-US" sz="3200" err="1">
                 <a:solidFill>
                   <a:srgbClr val="116E8A"/>
                 </a:solidFill>
@@ -6171,7 +6578,7 @@
               </a:rPr>
               <a:t>Flower_ID</a:t>
             </a:r>
-            <a:endParaRPr lang="en-GB" sz="3200" dirty="0">
+            <a:endParaRPr lang="en-GB" sz="3200">
               <a:solidFill>
                 <a:srgbClr val="116E8A"/>
               </a:solidFill>
@@ -6238,7 +6645,7 @@
           <a:lstStyle/>
           <a:p>
             <a:r>
-              <a:rPr lang="en-GB" sz="3200" dirty="0">
+              <a:rPr lang="en-GB" sz="3200">
                 <a:solidFill>
                   <a:srgbClr val="231F20"/>
                 </a:solidFill>
@@ -6247,12 +6654,12 @@
               </a:rPr>
               <a:t>Question a – model notation</a:t>
             </a:r>
-            <a:endParaRPr lang="en-GB" sz="3200" dirty="0"/>
-          </a:p>
-        </p:txBody>
-      </p:sp>
-      <mc:AlternateContent xmlns:mc="http://schemas.openxmlformats.org/markup-compatibility/2006" xmlns:a14="http://schemas.microsoft.com/office/drawing/2010/main">
-        <mc:Choice Requires="a14">
+            <a:endParaRPr lang="en-GB" sz="3200"/>
+          </a:p>
+        </p:txBody>
+      </p:sp>
+      <mc:AlternateContent xmlns:mc="http://schemas.openxmlformats.org/markup-compatibility/2006">
+        <mc:Choice xmlns:a14="http://schemas.microsoft.com/office/drawing/2010/main" Requires="a14">
           <p:sp>
             <p:nvSpPr>
               <p:cNvPr id="3" name="TextBox 2">
@@ -6268,7 +6675,7 @@
             <p:spPr>
               <a:xfrm>
                 <a:off x="970280" y="1597184"/>
-                <a:ext cx="10251440" cy="1932196"/>
+                <a:ext cx="10251440" cy="3399905"/>
               </a:xfrm>
               <a:prstGeom prst="rect">
                 <a:avLst/>
@@ -6599,7 +7006,229 @@
                           <a:ea typeface="Calibri" panose="020F0502020204030204" pitchFamily="34" charset="0"/>
                           <a:cs typeface="Arial" panose="020B0604020202020204" pitchFamily="34" charset="0"/>
                         </a:rPr>
-                        <m:t>+ </m:t>
+                        <m:t>+</m:t>
+                      </m:r>
+                      <m:sSub>
+                        <m:sSubPr>
+                          <m:ctrlPr>
+                            <a:rPr lang="en-GB" i="1" kern="100">
+                              <a:latin typeface="Cambria Math" panose="02040503050406030204" pitchFamily="18" charset="0"/>
+                              <a:ea typeface="Calibri" panose="020F0502020204030204" pitchFamily="34" charset="0"/>
+                              <a:cs typeface="Arial" panose="020B0604020202020204" pitchFamily="34" charset="0"/>
+                            </a:rPr>
+                          </m:ctrlPr>
+                        </m:sSubPr>
+                        <m:e>
+                          <m:r>
+                            <a:rPr lang="en-GB" i="1" kern="100">
+                              <a:latin typeface="Cambria Math" panose="02040503050406030204" pitchFamily="18" charset="0"/>
+                              <a:ea typeface="Calibri" panose="020F0502020204030204" pitchFamily="34" charset="0"/>
+                              <a:cs typeface="Arial" panose="020B0604020202020204" pitchFamily="34" charset="0"/>
+                            </a:rPr>
+                            <m:t>𝛽</m:t>
+                          </m:r>
+                        </m:e>
+                        <m:sub>
+                          <m:r>
+                            <a:rPr lang="en-US" i="1" kern="100">
+                              <a:latin typeface="Cambria Math" panose="02040503050406030204" pitchFamily="18" charset="0"/>
+                              <a:ea typeface="Calibri" panose="020F0502020204030204" pitchFamily="34" charset="0"/>
+                              <a:cs typeface="Arial" panose="020B0604020202020204" pitchFamily="34" charset="0"/>
+                            </a:rPr>
+                            <m:t>𝑝</m:t>
+                          </m:r>
+                        </m:sub>
+                      </m:sSub>
+                      <m:sSub>
+                        <m:sSubPr>
+                          <m:ctrlPr>
+                            <a:rPr lang="en-GB" i="1" kern="100">
+                              <a:latin typeface="Cambria Math" panose="02040503050406030204" pitchFamily="18" charset="0"/>
+                              <a:ea typeface="Calibri" panose="020F0502020204030204" pitchFamily="34" charset="0"/>
+                              <a:cs typeface="Arial" panose="020B0604020202020204" pitchFamily="34" charset="0"/>
+                            </a:rPr>
+                          </m:ctrlPr>
+                        </m:sSubPr>
+                        <m:e>
+                          <m:r>
+                            <a:rPr lang="en-US" i="1" kern="100">
+                              <a:latin typeface="Cambria Math" panose="02040503050406030204" pitchFamily="18" charset="0"/>
+                              <a:ea typeface="Calibri" panose="020F0502020204030204" pitchFamily="34" charset="0"/>
+                              <a:cs typeface="Arial" panose="020B0604020202020204" pitchFamily="34" charset="0"/>
+                            </a:rPr>
+                            <m:t>𝑡𝑖𝑚𝑒</m:t>
+                          </m:r>
+                        </m:e>
+                        <m:sub>
+                          <m:r>
+                            <a:rPr lang="en-US" i="1" kern="100">
+                              <a:latin typeface="Cambria Math" panose="02040503050406030204" pitchFamily="18" charset="0"/>
+                              <a:ea typeface="Calibri" panose="020F0502020204030204" pitchFamily="34" charset="0"/>
+                              <a:cs typeface="Arial" panose="020B0604020202020204" pitchFamily="34" charset="0"/>
+                            </a:rPr>
+                            <m:t>𝑖𝑗</m:t>
+                          </m:r>
+                        </m:sub>
+                      </m:sSub>
+                      <m:r>
+                        <a:rPr lang="en-US" b="0" i="1" kern="100" smtClean="0">
+                          <a:latin typeface="Cambria Math" panose="02040503050406030204" pitchFamily="18" charset="0"/>
+                          <a:ea typeface="Calibri" panose="020F0502020204030204" pitchFamily="34" charset="0"/>
+                          <a:cs typeface="Arial" panose="020B0604020202020204" pitchFamily="34" charset="0"/>
+                        </a:rPr>
+                        <m:t>+</m:t>
+                      </m:r>
+                      <m:nary>
+                        <m:naryPr>
+                          <m:chr m:val="∑"/>
+                          <m:limLoc m:val="undOvr"/>
+                          <m:ctrlPr>
+                            <a:rPr lang="en-GB" i="1" kern="100">
+                              <a:latin typeface="Cambria Math" panose="02040503050406030204" pitchFamily="18" charset="0"/>
+                              <a:ea typeface="Calibri" panose="020F0502020204030204" pitchFamily="34" charset="0"/>
+                              <a:cs typeface="Arial" panose="020B0604020202020204" pitchFamily="34" charset="0"/>
+                            </a:rPr>
+                          </m:ctrlPr>
+                        </m:naryPr>
+                        <m:sub>
+                          <m:r>
+                            <a:rPr lang="en-US" b="0" i="1" kern="100" smtClean="0">
+                              <a:latin typeface="Cambria Math" panose="02040503050406030204" pitchFamily="18" charset="0"/>
+                              <a:ea typeface="Calibri" panose="020F0502020204030204" pitchFamily="34" charset="0"/>
+                              <a:cs typeface="Arial" panose="020B0604020202020204" pitchFamily="34" charset="0"/>
+                            </a:rPr>
+                            <m:t>𝑞</m:t>
+                          </m:r>
+                          <m:r>
+                            <a:rPr lang="en-GB" i="1" kern="100">
+                              <a:latin typeface="Cambria Math" panose="02040503050406030204" pitchFamily="18" charset="0"/>
+                              <a:ea typeface="Calibri" panose="020F0502020204030204" pitchFamily="34" charset="0"/>
+                              <a:cs typeface="Arial" panose="020B0604020202020204" pitchFamily="34" charset="0"/>
+                            </a:rPr>
+                            <m:t>=</m:t>
+                          </m:r>
+                          <m:r>
+                            <a:rPr lang="en-US" b="0" i="1" kern="100" smtClean="0">
+                              <a:latin typeface="Cambria Math" panose="02040503050406030204" pitchFamily="18" charset="0"/>
+                              <a:ea typeface="Calibri" panose="020F0502020204030204" pitchFamily="34" charset="0"/>
+                              <a:cs typeface="Arial" panose="020B0604020202020204" pitchFamily="34" charset="0"/>
+                            </a:rPr>
+                            <m:t>2</m:t>
+                          </m:r>
+                        </m:sub>
+                        <m:sup>
+                          <m:r>
+                            <a:rPr lang="en-US" b="0" i="1" kern="100" smtClean="0">
+                              <a:latin typeface="Cambria Math" panose="02040503050406030204" pitchFamily="18" charset="0"/>
+                              <a:ea typeface="Calibri" panose="020F0502020204030204" pitchFamily="34" charset="0"/>
+                              <a:cs typeface="Arial" panose="020B0604020202020204" pitchFamily="34" charset="0"/>
+                            </a:rPr>
+                            <m:t>15</m:t>
+                          </m:r>
+                        </m:sup>
+                        <m:e>
+                          <m:sSub>
+                            <m:sSubPr>
+                              <m:ctrlPr>
+                                <a:rPr lang="en-GB" i="1" kern="100">
+                                  <a:latin typeface="Cambria Math" panose="02040503050406030204" pitchFamily="18" charset="0"/>
+                                  <a:ea typeface="Calibri" panose="020F0502020204030204" pitchFamily="34" charset="0"/>
+                                  <a:cs typeface="Arial" panose="020B0604020202020204" pitchFamily="34" charset="0"/>
+                                </a:rPr>
+                              </m:ctrlPr>
+                            </m:sSubPr>
+                            <m:e>
+                              <m:r>
+                                <a:rPr lang="en-GB" i="1" kern="100">
+                                  <a:latin typeface="Cambria Math" panose="02040503050406030204" pitchFamily="18" charset="0"/>
+                                  <a:ea typeface="Calibri" panose="020F0502020204030204" pitchFamily="34" charset="0"/>
+                                  <a:cs typeface="Arial" panose="020B0604020202020204" pitchFamily="34" charset="0"/>
+                                </a:rPr>
+                                <m:t>𝛽</m:t>
+                              </m:r>
+                            </m:e>
+                            <m:sub>
+                              <m:r>
+                                <a:rPr lang="en-US" b="0" i="1" kern="100" smtClean="0">
+                                  <a:latin typeface="Cambria Math" panose="02040503050406030204" pitchFamily="18" charset="0"/>
+                                  <a:ea typeface="Calibri" panose="020F0502020204030204" pitchFamily="34" charset="0"/>
+                                  <a:cs typeface="Arial" panose="020B0604020202020204" pitchFamily="34" charset="0"/>
+                                </a:rPr>
+                                <m:t>𝑞</m:t>
+                              </m:r>
+                            </m:sub>
+                          </m:sSub>
+                          <m:sSub>
+                            <m:sSubPr>
+                              <m:ctrlPr>
+                                <a:rPr lang="en-GB" i="1" kern="100">
+                                  <a:latin typeface="Cambria Math" panose="02040503050406030204" pitchFamily="18" charset="0"/>
+                                  <a:ea typeface="Calibri" panose="020F0502020204030204" pitchFamily="34" charset="0"/>
+                                  <a:cs typeface="Arial" panose="020B0604020202020204" pitchFamily="34" charset="0"/>
+                                </a:rPr>
+                              </m:ctrlPr>
+                            </m:sSubPr>
+                            <m:e>
+                              <m:r>
+                                <a:rPr lang="en-US" i="1" kern="100">
+                                  <a:latin typeface="Cambria Math" panose="02040503050406030204" pitchFamily="18" charset="0"/>
+                                  <a:ea typeface="Calibri" panose="020F0502020204030204" pitchFamily="34" charset="0"/>
+                                  <a:cs typeface="Arial" panose="020B0604020202020204" pitchFamily="34" charset="0"/>
+                                </a:rPr>
+                                <m:t>𝑡𝑖𝑚𝑒</m:t>
+                              </m:r>
+                            </m:e>
+                            <m:sub>
+                              <m:r>
+                                <a:rPr lang="en-US" i="1" kern="100">
+                                  <a:latin typeface="Cambria Math" panose="02040503050406030204" pitchFamily="18" charset="0"/>
+                                  <a:ea typeface="Calibri" panose="020F0502020204030204" pitchFamily="34" charset="0"/>
+                                  <a:cs typeface="Arial" panose="020B0604020202020204" pitchFamily="34" charset="0"/>
+                                </a:rPr>
+                                <m:t>𝑝</m:t>
+                              </m:r>
+                            </m:sub>
+                          </m:sSub>
+                          <m:sSub>
+                            <m:sSubPr>
+                              <m:ctrlPr>
+                                <a:rPr lang="en-GB" i="1" kern="100">
+                                  <a:latin typeface="Cambria Math" panose="02040503050406030204" pitchFamily="18" charset="0"/>
+                                  <a:ea typeface="Calibri" panose="020F0502020204030204" pitchFamily="34" charset="0"/>
+                                  <a:cs typeface="Arial" panose="020B0604020202020204" pitchFamily="34" charset="0"/>
+                                </a:rPr>
+                              </m:ctrlPr>
+                            </m:sSubPr>
+                            <m:e>
+                              <m:r>
+                                <a:rPr lang="en-GB" i="1" kern="100">
+                                  <a:latin typeface="Cambria Math" panose="02040503050406030204" pitchFamily="18" charset="0"/>
+                                  <a:ea typeface="Calibri" panose="020F0502020204030204" pitchFamily="34" charset="0"/>
+                                  <a:cs typeface="Arial" panose="020B0604020202020204" pitchFamily="34" charset="0"/>
+                                </a:rPr>
+                                <m:t>𝐶𝑜𝑚𝑝𝑜𝑢𝑛𝑑</m:t>
+                              </m:r>
+                            </m:e>
+                            <m:sub>
+                              <m:r>
+                                <a:rPr lang="en-GB" i="1" kern="100">
+                                  <a:latin typeface="Cambria Math" panose="02040503050406030204" pitchFamily="18" charset="0"/>
+                                  <a:ea typeface="Calibri" panose="020F0502020204030204" pitchFamily="34" charset="0"/>
+                                  <a:cs typeface="Arial" panose="020B0604020202020204" pitchFamily="34" charset="0"/>
+                                </a:rPr>
+                                <m:t>𝑘</m:t>
+                              </m:r>
+                            </m:sub>
+                          </m:sSub>
+                        </m:e>
+                      </m:nary>
+                      <m:r>
+                        <a:rPr lang="en-US" b="0" i="1" kern="100" smtClean="0">
+                          <a:latin typeface="Cambria Math" panose="02040503050406030204" pitchFamily="18" charset="0"/>
+                          <a:ea typeface="Calibri" panose="020F0502020204030204" pitchFamily="34" charset="0"/>
+                          <a:cs typeface="Arial" panose="020B0604020202020204" pitchFamily="34" charset="0"/>
+                        </a:rPr>
+                        <m:t>+</m:t>
                       </m:r>
                       <m:nary>
                         <m:naryPr>
@@ -6693,7 +7322,7 @@
                             </m:sSubPr>
                             <m:e>
                               <m:r>
-                                <a:rPr lang="en-GB" sz="1800" i="1" kern="100">
+                                <a:rPr lang="en-GB" sz="1800" i="1" kern="100" smtClean="0">
                                   <a:effectLst/>
                                   <a:latin typeface="Cambria Math" panose="02040503050406030204" pitchFamily="18" charset="0"/>
                                   <a:ea typeface="Calibri" panose="020F0502020204030204" pitchFamily="34" charset="0"/>
@@ -6919,13 +7548,22 @@
                                 </m:sSubPr>
                                 <m:e>
                                   <m:r>
+                                    <a:rPr lang="en-US" sz="1800" b="0" i="1" kern="100" smtClean="0">
+                                      <a:effectLst/>
+                                      <a:latin typeface="Cambria Math" panose="02040503050406030204" pitchFamily="18" charset="0"/>
+                                      <a:ea typeface="Calibri" panose="020F0502020204030204" pitchFamily="34" charset="0"/>
+                                      <a:cs typeface="Arial" panose="020B0604020202020204" pitchFamily="34" charset="0"/>
+                                    </a:rPr>
+                                    <m:t>𝑠𝑢𝑏</m:t>
+                                  </m:r>
+                                  <m:r>
                                     <a:rPr lang="en-GB" sz="1800" i="1" kern="100">
                                       <a:effectLst/>
                                       <a:latin typeface="Cambria Math" panose="02040503050406030204" pitchFamily="18" charset="0"/>
                                       <a:ea typeface="Calibri" panose="020F0502020204030204" pitchFamily="34" charset="0"/>
                                       <a:cs typeface="Arial" panose="020B0604020202020204" pitchFamily="34" charset="0"/>
                                     </a:rPr>
-                                    <m:t>𝑠𝑢𝑏𝑝𝑙𝑜𝑡</m:t>
+                                    <m:t>𝑝𝑙𝑜𝑡</m:t>
                                   </m:r>
                                 </m:e>
                                 <m:sub>
@@ -6967,7 +7605,7 @@
                     </m:oMath>
                   </m:oMathPara>
                 </a14:m>
-                <a:endParaRPr lang="en-GB" sz="1800" kern="100" dirty="0">
+                <a:endParaRPr lang="en-GB" sz="1800" kern="100">
                   <a:effectLst/>
                   <a:latin typeface="Calibri" panose="020F0502020204030204" pitchFamily="34" charset="0"/>
                   <a:ea typeface="Calibri" panose="020F0502020204030204" pitchFamily="34" charset="0"/>
@@ -6984,7 +7622,7 @@
                   </a:spcAft>
                 </a:pPr>
                 <a:r>
-                  <a:rPr lang="en-GB" sz="1800" kern="100" dirty="0">
+                  <a:rPr lang="en-GB" sz="1800" kern="100">
                     <a:effectLst/>
                     <a:latin typeface="Calibri" panose="020F0502020204030204" pitchFamily="34" charset="0"/>
                     <a:ea typeface="Calibri" panose="020F0502020204030204" pitchFamily="34" charset="0"/>
@@ -7031,7 +7669,7 @@
                   </m:oMath>
                 </a14:m>
                 <a:r>
-                  <a:rPr lang="en-GB" sz="1800" kern="100" dirty="0">
+                  <a:rPr lang="en-GB" sz="1800" kern="100">
                     <a:effectLst/>
                     <a:latin typeface="Calibri" panose="020F0502020204030204" pitchFamily="34" charset="0"/>
                     <a:ea typeface="Calibri" panose="020F0502020204030204" pitchFamily="34" charset="0"/>
@@ -7040,7 +7678,7 @@
                   <a:t> is the probability that the </a:t>
                 </a:r>
                 <a:r>
-                  <a:rPr lang="en-GB" sz="1800" kern="100" dirty="0" err="1">
+                  <a:rPr lang="en-GB" sz="1800" kern="100" err="1">
                     <a:effectLst/>
                     <a:latin typeface="Calibri" panose="020F0502020204030204" pitchFamily="34" charset="0"/>
                     <a:ea typeface="Calibri" panose="020F0502020204030204" pitchFamily="34" charset="0"/>
@@ -7049,7 +7687,7 @@
                   <a:t>i</a:t>
                 </a:r>
                 <a:r>
-                  <a:rPr lang="en-GB" sz="1800" kern="100" baseline="30000" dirty="0" err="1">
+                  <a:rPr lang="en-GB" sz="1800" kern="100" baseline="30000" err="1">
                     <a:effectLst/>
                     <a:latin typeface="Calibri" panose="020F0502020204030204" pitchFamily="34" charset="0"/>
                     <a:ea typeface="Calibri" panose="020F0502020204030204" pitchFamily="34" charset="0"/>
@@ -7058,7 +7696,7 @@
                   <a:t>th</a:t>
                 </a:r>
                 <a:r>
-                  <a:rPr lang="en-GB" sz="1800" kern="100" dirty="0">
+                  <a:rPr lang="en-GB" sz="1800" kern="100">
                     <a:effectLst/>
                     <a:latin typeface="Calibri" panose="020F0502020204030204" pitchFamily="34" charset="0"/>
                     <a:ea typeface="Calibri" panose="020F0502020204030204" pitchFamily="34" charset="0"/>
@@ -7067,7 +7705,7 @@
                   <a:t> flower stays "fresh" on day </a:t>
                 </a:r>
                 <a:r>
-                  <a:rPr lang="en-GB" sz="1800" kern="100" dirty="0" err="1">
+                  <a:rPr lang="en-GB" sz="1800" kern="100" err="1">
                     <a:effectLst/>
                     <a:latin typeface="Calibri" panose="020F0502020204030204" pitchFamily="34" charset="0"/>
                     <a:ea typeface="Calibri" panose="020F0502020204030204" pitchFamily="34" charset="0"/>
@@ -7076,7 +7714,7 @@
                   <a:t>j</a:t>
                 </a:r>
                 <a:r>
-                  <a:rPr lang="en-GB" sz="1800" kern="100" baseline="30000" dirty="0" err="1">
+                  <a:rPr lang="en-GB" sz="1800" kern="100" baseline="30000" err="1">
                     <a:effectLst/>
                     <a:latin typeface="Calibri" panose="020F0502020204030204" pitchFamily="34" charset="0"/>
                     <a:ea typeface="Calibri" panose="020F0502020204030204" pitchFamily="34" charset="0"/>
@@ -7085,7 +7723,7 @@
                   <a:t>th</a:t>
                 </a:r>
                 <a:r>
-                  <a:rPr lang="en-GB" sz="1800" kern="100" dirty="0">
+                  <a:rPr lang="en-GB" sz="1800" kern="100">
                     <a:effectLst/>
                     <a:latin typeface="Calibri" panose="020F0502020204030204" pitchFamily="34" charset="0"/>
                     <a:ea typeface="Calibri" panose="020F0502020204030204" pitchFamily="34" charset="0"/>
@@ -7094,7 +7732,7 @@
                   <a:t>. </a:t>
                 </a:r>
                 <a:r>
-                  <a:rPr lang="en-GB" sz="1800" kern="100" dirty="0" err="1">
+                  <a:rPr lang="en-GB" sz="1800" kern="100" err="1">
                     <a:effectLst/>
                     <a:latin typeface="Calibri" panose="020F0502020204030204" pitchFamily="34" charset="0"/>
                     <a:ea typeface="Calibri" panose="020F0502020204030204" pitchFamily="34" charset="0"/>
@@ -7103,7 +7741,7 @@
                   <a:t>Compound</a:t>
                 </a:r>
                 <a:r>
-                  <a:rPr lang="en-GB" sz="1800" kern="100" baseline="-25000" dirty="0" err="1">
+                  <a:rPr lang="en-GB" sz="1800" kern="100" baseline="-25000" err="1">
                     <a:effectLst/>
                     <a:latin typeface="Calibri" panose="020F0502020204030204" pitchFamily="34" charset="0"/>
                     <a:ea typeface="Calibri" panose="020F0502020204030204" pitchFamily="34" charset="0"/>
@@ -7112,7 +7750,7 @@
                   <a:t>k</a:t>
                 </a:r>
                 <a:r>
-                  <a:rPr lang="en-GB" sz="1800" kern="100" dirty="0">
+                  <a:rPr lang="en-GB" sz="1800" kern="100">
                     <a:effectLst/>
                     <a:latin typeface="Calibri" panose="020F0502020204030204" pitchFamily="34" charset="0"/>
                     <a:ea typeface="Calibri" panose="020F0502020204030204" pitchFamily="34" charset="0"/>
@@ -7159,7 +7797,7 @@
                   </m:oMath>
                 </a14:m>
                 <a:r>
-                  <a:rPr lang="en-GB" sz="1800" kern="100" dirty="0">
+                  <a:rPr lang="en-GB" sz="1800" kern="100">
                     <a:effectLst/>
                     <a:latin typeface="Calibri" panose="020F0502020204030204" pitchFamily="34" charset="0"/>
                     <a:ea typeface="Calibri" panose="020F0502020204030204" pitchFamily="34" charset="0"/>
@@ -7171,7 +7809,7 @@
             </p:txBody>
           </p:sp>
         </mc:Choice>
-        <mc:Fallback xmlns="">
+        <mc:Fallback>
           <p:sp>
             <p:nvSpPr>
               <p:cNvPr id="3" name="TextBox 2">
@@ -7189,7 +7827,7 @@
             <p:spPr>
               <a:xfrm>
                 <a:off x="970280" y="1597184"/>
-                <a:ext cx="10251440" cy="1932196"/>
+                <a:ext cx="10251440" cy="3399905"/>
               </a:xfrm>
               <a:prstGeom prst="rect">
                 <a:avLst/>
@@ -7197,7 +7835,7 @@
               <a:blipFill>
                 <a:blip r:embed="rId3"/>
                 <a:stretch>
-                  <a:fillRect l="-476" b="-4101"/>
+                  <a:fillRect l="-476" b="-1792"/>
                 </a:stretch>
               </a:blipFill>
             </p:spPr>
@@ -7206,7 +7844,7 @@
               <a:lstStyle/>
               <a:p>
                 <a:r>
-                  <a:rPr lang="en-GB">
+                  <a:rPr lang="en-US">
                     <a:noFill/>
                   </a:rPr>
                   <a:t> </a:t>
@@ -7275,7 +7913,7 @@
           <a:lstStyle/>
           <a:p>
             <a:r>
-              <a:rPr lang="en-GB" sz="3200" dirty="0">
+              <a:rPr lang="en-GB" sz="3200">
                 <a:solidFill>
                   <a:srgbClr val="231F20"/>
                 </a:solidFill>
@@ -7284,7 +7922,7 @@
               </a:rPr>
               <a:t>Question a – benefits and drawbacks of GEE</a:t>
             </a:r>
-            <a:endParaRPr lang="en-GB" sz="3200" dirty="0"/>
+            <a:endParaRPr lang="en-GB" sz="3200"/>
           </a:p>
         </p:txBody>
       </p:sp>
@@ -7303,7 +7941,7 @@
         <p:spPr>
           <a:xfrm>
             <a:off x="274714" y="4109591"/>
-            <a:ext cx="9692640" cy="2554545"/>
+            <a:ext cx="11791070" cy="3046988"/>
           </a:xfrm>
           <a:prstGeom prst="rect">
             <a:avLst/>
@@ -7311,77 +7949,104 @@
           <a:noFill/>
         </p:spPr>
         <p:txBody>
-          <a:bodyPr wrap="square" rtlCol="0">
+          <a:bodyPr wrap="square" lIns="91440" tIns="45720" rIns="91440" bIns="45720" rtlCol="0" anchor="t">
             <a:spAutoFit/>
           </a:bodyPr>
           <a:lstStyle/>
+          <a:p>
+            <a:pPr marL="457200" indent="-457200">
+              <a:buFont typeface="Arial,Sans-Serif" panose="020B0604020202020204" pitchFamily="34" charset="0"/>
+              <a:buChar char="•"/>
+            </a:pPr>
+            <a:r>
+              <a:rPr lang="en-GB" sz="3200">
+                <a:solidFill>
+                  <a:srgbClr val="116E8A"/>
+                </a:solidFill>
+                <a:latin typeface="Arial"/>
+                <a:cs typeface="Arial"/>
+              </a:rPr>
+              <a:t>Should go for GLMM? But then</a:t>
+            </a:r>
+            <a:endParaRPr lang="en-US" sz="3200">
+              <a:solidFill>
+                <a:srgbClr val="116E8A"/>
+              </a:solidFill>
+              <a:latin typeface="Arial"/>
+              <a:cs typeface="Arial"/>
+            </a:endParaRPr>
+          </a:p>
+          <a:p>
+            <a:pPr marL="914400" lvl="1" indent="-457200">
+              <a:buFont typeface="Arial,Sans-Serif" panose="020B0604020202020204" pitchFamily="34" charset="0"/>
+              <a:buChar char="•"/>
+            </a:pPr>
+            <a:r>
+              <a:rPr lang="en-GB" sz="3200">
+                <a:solidFill>
+                  <a:srgbClr val="116E8A"/>
+                </a:solidFill>
+                <a:latin typeface="Arial"/>
+                <a:cs typeface="Arial"/>
+              </a:rPr>
+              <a:t>No marginal interpretation</a:t>
+            </a:r>
+            <a:endParaRPr lang="en-US" sz="3200">
+              <a:solidFill>
+                <a:srgbClr val="116E8A"/>
+              </a:solidFill>
+              <a:latin typeface="Arial"/>
+              <a:cs typeface="Arial"/>
+            </a:endParaRPr>
+          </a:p>
+          <a:p>
+            <a:pPr marL="914400" lvl="1" indent="-457200">
+              <a:buFont typeface="Arial,Sans-Serif" panose="020B0604020202020204" pitchFamily="34" charset="0"/>
+              <a:buChar char="•"/>
+            </a:pPr>
+            <a:r>
+              <a:rPr lang="en-GB" sz="3200">
+                <a:solidFill>
+                  <a:srgbClr val="116E8A"/>
+                </a:solidFill>
+                <a:latin typeface="Arial"/>
+                <a:cs typeface="Arial"/>
+              </a:rPr>
+              <a:t>Complex nested model structure</a:t>
+            </a:r>
+            <a:endParaRPr lang="en-GB"/>
+          </a:p>
           <a:p>
             <a:pPr marL="457200" indent="-457200">
               <a:buFont typeface="Arial" panose="020B0604020202020204" pitchFamily="34" charset="0"/>
               <a:buChar char="•"/>
             </a:pPr>
             <a:r>
-              <a:rPr lang="en-GB" sz="3200" dirty="0">
+              <a:rPr lang="en-GB" sz="3200">
                 <a:solidFill>
                   <a:srgbClr val="116E8A"/>
                 </a:solidFill>
-                <a:latin typeface="Arial" panose="020B0604020202020204" pitchFamily="34" charset="0"/>
-                <a:cs typeface="Arial" panose="020B0604020202020204" pitchFamily="34" charset="0"/>
+                <a:latin typeface="Arial"/>
+                <a:cs typeface="Arial"/>
               </a:rPr>
-              <a:t>Can’t take into account other clustering effect: i.e. compound, species, subplot, rater</a:t>
-            </a:r>
+              <a:t>Can’t take into account other clustering effect: i.e. species, subplot, rater --&gt; can added as covariates in GEE model</a:t>
+            </a:r>
+            <a:endParaRPr lang="de-DE">
+              <a:ea typeface="Calibri"/>
+              <a:cs typeface="Calibri"/>
+            </a:endParaRPr>
           </a:p>
           <a:p>
             <a:pPr marL="457200" indent="-457200">
               <a:buFont typeface="Arial" panose="020B0604020202020204" pitchFamily="34" charset="0"/>
               <a:buChar char="•"/>
             </a:pPr>
-            <a:r>
-              <a:rPr lang="en-GB" sz="3200" dirty="0">
-                <a:solidFill>
-                  <a:srgbClr val="116E8A"/>
-                </a:solidFill>
-                <a:latin typeface="Arial" panose="020B0604020202020204" pitchFamily="34" charset="0"/>
-                <a:cs typeface="Arial" panose="020B0604020202020204" pitchFamily="34" charset="0"/>
-              </a:rPr>
-              <a:t>Should go for GLMM? But then</a:t>
-            </a:r>
-          </a:p>
-          <a:p>
-            <a:pPr marL="914400" lvl="1" indent="-457200">
-              <a:buFont typeface="Arial" panose="020B0604020202020204" pitchFamily="34" charset="0"/>
-              <a:buChar char="•"/>
-            </a:pPr>
-            <a:r>
-              <a:rPr lang="en-GB" sz="3200" dirty="0">
-                <a:solidFill>
-                  <a:srgbClr val="116E8A"/>
-                </a:solidFill>
-                <a:latin typeface="Arial" panose="020B0604020202020204" pitchFamily="34" charset="0"/>
-                <a:cs typeface="Arial" panose="020B0604020202020204" pitchFamily="34" charset="0"/>
-              </a:rPr>
-              <a:t>No marginal interpretation</a:t>
-            </a:r>
-          </a:p>
-          <a:p>
-            <a:pPr marL="914400" lvl="1" indent="-457200">
-              <a:buFont typeface="Arial" panose="020B0604020202020204" pitchFamily="34" charset="0"/>
-              <a:buChar char="•"/>
-            </a:pPr>
-            <a:r>
-              <a:rPr lang="en-GB" sz="3200" dirty="0">
-                <a:solidFill>
-                  <a:srgbClr val="116E8A"/>
-                </a:solidFill>
-                <a:latin typeface="Arial" panose="020B0604020202020204" pitchFamily="34" charset="0"/>
-                <a:cs typeface="Arial" panose="020B0604020202020204" pitchFamily="34" charset="0"/>
-              </a:rPr>
-              <a:t>Complex nested model structure</a:t>
-            </a:r>
-            <a:endParaRPr lang="en-GB" sz="3200" dirty="0">
+            <a:endParaRPr lang="en-GB" sz="3200">
               <a:solidFill>
                 <a:srgbClr val="116E8A"/>
               </a:solidFill>
+              <a:latin typeface="Arial"/>
+              <a:cs typeface="Arial"/>
             </a:endParaRPr>
           </a:p>
         </p:txBody>
@@ -7419,7 +8084,7 @@
               <a:buChar char="•"/>
             </a:pPr>
             <a:r>
-              <a:rPr lang="en-GB" sz="3200" dirty="0">
+              <a:rPr lang="en-GB" sz="3200">
                 <a:solidFill>
                   <a:srgbClr val="116E8A"/>
                 </a:solidFill>
@@ -7435,7 +8100,7 @@
               <a:buChar char="•"/>
             </a:pPr>
             <a:r>
-              <a:rPr lang="en-GB" sz="3200" dirty="0">
+              <a:rPr lang="en-GB" sz="3200">
                 <a:solidFill>
                   <a:srgbClr val="116E8A"/>
                 </a:solidFill>
@@ -7451,7 +8116,7 @@
               <a:buChar char="•"/>
             </a:pPr>
             <a:r>
-              <a:rPr lang="en-GB" sz="3200" dirty="0">
+              <a:rPr lang="en-GB" sz="3200">
                 <a:solidFill>
                   <a:srgbClr val="116E8A"/>
                 </a:solidFill>
@@ -7466,7 +8131,7 @@
               <a:buFont typeface="Arial" panose="020B0604020202020204" pitchFamily="34" charset="0"/>
               <a:buChar char="•"/>
             </a:pPr>
-            <a:endParaRPr lang="en-GB" sz="3200" dirty="0">
+            <a:endParaRPr lang="en-GB" sz="3200">
               <a:solidFill>
                 <a:srgbClr val="116E8A"/>
               </a:solidFill>
@@ -7533,7 +8198,7 @@
           <a:lstStyle/>
           <a:p>
             <a:r>
-              <a:rPr lang="en-GB" sz="3200" dirty="0">
+              <a:rPr lang="en-GB" sz="3200">
                 <a:solidFill>
                   <a:srgbClr val="231F20"/>
                 </a:solidFill>
@@ -7542,7 +8207,7 @@
               </a:rPr>
               <a:t>Question c – EDA</a:t>
             </a:r>
-            <a:endParaRPr lang="en-GB" sz="3200" dirty="0"/>
+            <a:endParaRPr lang="en-GB" sz="3200"/>
           </a:p>
         </p:txBody>
       </p:sp>
@@ -7561,13 +8226,13 @@
           <p:nvPr/>
         </p:nvPicPr>
         <p:blipFill>
-          <a:blip r:embed="rId3">
+          <a:blip r:embed="rId4">
             <a:extLst>
               <a:ext uri="{28A0092B-C50C-407E-A947-70E740481C1C}">
                 <a14:useLocalDpi xmlns:a14="http://schemas.microsoft.com/office/drawing/2010/main" val="0"/>
               </a:ext>
               <a:ext uri="{96DAC541-7B7A-43D3-8B79-37D633B846F1}">
-                <asvg:svgBlip xmlns:asvg="http://schemas.microsoft.com/office/drawing/2016/SVG/main" r:embed="rId4"/>
+                <asvg:svgBlip xmlns:asvg="http://schemas.microsoft.com/office/drawing/2016/SVG/main" r:embed="rId5"/>
               </a:ext>
             </a:extLst>
           </a:blip>
@@ -7594,6 +8259,11 @@
   <p:clrMapOvr>
     <a:masterClrMapping/>
   </p:clrMapOvr>
+  <p:extLst>
+    <p:ext uri="{6950BFC3-D8DA-4A85-94F7-54DA5524770B}">
+      <p188:commentRel xmlns:p188="http://schemas.microsoft.com/office/powerpoint/2018/8/main" r:id="rId3"/>
+    </p:ext>
+  </p:extLst>
 </p:sld>
 </file>
 
@@ -7614,12 +8284,70 @@
           <a:chExt cx="0" cy="0"/>
         </a:xfrm>
       </p:grpSpPr>
-      <p:sp>
-        <p:nvSpPr>
-          <p:cNvPr id="4" name="TextBox 3">
-            <a:extLst>
-              <a:ext uri="{FF2B5EF4-FFF2-40B4-BE49-F238E27FC236}">
-                <a16:creationId xmlns:a16="http://schemas.microsoft.com/office/drawing/2014/main" id="{C33C1ABC-6DBF-68C2-375E-7D9D853BD9CF}"/>
+      <p:pic>
+        <p:nvPicPr>
+          <p:cNvPr id="7" name="Inhaltsplatzhalter 6" descr="Ein Bild, das Text, Screenshot, Reihe, Diagramm enthält.&#10;&#10;Beschreibung automatisch generiert.">
+            <a:extLst>
+              <a:ext uri="{FF2B5EF4-FFF2-40B4-BE49-F238E27FC236}">
+                <a16:creationId xmlns:a16="http://schemas.microsoft.com/office/drawing/2014/main" id="{90AEAA7C-493B-91F4-23A0-6590DE146975}"/>
+              </a:ext>
+            </a:extLst>
+          </p:cNvPr>
+          <p:cNvPicPr>
+            <a:picLocks noGrp="1" noChangeAspect="1"/>
+          </p:cNvPicPr>
+          <p:nvPr>
+            <p:ph idx="1"/>
+          </p:nvPr>
+        </p:nvPicPr>
+        <p:blipFill>
+          <a:blip r:embed="rId2"/>
+          <a:stretch>
+            <a:fillRect/>
+          </a:stretch>
+        </p:blipFill>
+        <p:spPr>
+          <a:xfrm>
+            <a:off x="1467556" y="975293"/>
+            <a:ext cx="9114820" cy="5659045"/>
+          </a:xfrm>
+        </p:spPr>
+      </p:pic>
+      <p:sp>
+        <p:nvSpPr>
+          <p:cNvPr id="4" name="Foliennummernplatzhalter 3">
+            <a:extLst>
+              <a:ext uri="{FF2B5EF4-FFF2-40B4-BE49-F238E27FC236}">
+                <a16:creationId xmlns:a16="http://schemas.microsoft.com/office/drawing/2014/main" id="{82E4413C-5766-9580-B444-D0658DCDEC3F}"/>
+              </a:ext>
+            </a:extLst>
+          </p:cNvPr>
+          <p:cNvSpPr>
+            <a:spLocks noGrp="1"/>
+          </p:cNvSpPr>
+          <p:nvPr>
+            <p:ph type="sldNum" sz="quarter" idx="12"/>
+          </p:nvPr>
+        </p:nvSpPr>
+        <p:spPr/>
+        <p:txBody>
+          <a:bodyPr/>
+          <a:lstStyle/>
+          <a:p>
+            <a:fld id="{6A94DD54-3F72-4946-B88E-01AC62404546}" type="slidenum">
+              <a:rPr lang="en-GB" smtClean="0"/>
+              <a:t>7</a:t>
+            </a:fld>
+            <a:endParaRPr lang="en-GB"/>
+          </a:p>
+        </p:txBody>
+      </p:sp>
+      <p:sp>
+        <p:nvSpPr>
+          <p:cNvPr id="6" name="TextBox 3">
+            <a:extLst>
+              <a:ext uri="{FF2B5EF4-FFF2-40B4-BE49-F238E27FC236}">
+                <a16:creationId xmlns:a16="http://schemas.microsoft.com/office/drawing/2014/main" id="{0457BC2A-1CEE-D81F-531E-2106B4E4706E}"/>
               </a:ext>
             </a:extLst>
           </p:cNvPr>
@@ -7643,7 +8371,388 @@
           <a:lstStyle/>
           <a:p>
             <a:r>
-              <a:rPr lang="en-GB" sz="3200" dirty="0">
+              <a:rPr lang="en-GB" sz="3200">
+                <a:solidFill>
+                  <a:srgbClr val="231F20"/>
+                </a:solidFill>
+                <a:latin typeface="Arial" panose="020B0604020202020204" pitchFamily="34" charset="0"/>
+                <a:cs typeface="Arial" panose="020B0604020202020204" pitchFamily="34" charset="0"/>
+              </a:rPr>
+              <a:t>Question c – EDA</a:t>
+            </a:r>
+            <a:endParaRPr lang="en-GB" sz="3200"/>
+          </a:p>
+        </p:txBody>
+      </p:sp>
+    </p:spTree>
+    <p:extLst>
+      <p:ext uri="{BB962C8B-B14F-4D97-AF65-F5344CB8AC3E}">
+        <p14:creationId xmlns:p14="http://schemas.microsoft.com/office/powerpoint/2010/main" val="3573558212"/>
+      </p:ext>
+    </p:extLst>
+  </p:cSld>
+  <p:clrMapOvr>
+    <a:masterClrMapping/>
+  </p:clrMapOvr>
+</p:sld>
+</file>
+
+<file path=ppt/slides/slide8.xml><?xml version="1.0" encoding="utf-8"?>
+<p:sld xmlns:a="http://schemas.openxmlformats.org/drawingml/2006/main" xmlns:r="http://schemas.openxmlformats.org/officeDocument/2006/relationships" xmlns:p="http://schemas.openxmlformats.org/presentationml/2006/main">
+  <p:cSld>
+    <p:bg>
+      <p:bgPr>
+        <a:solidFill>
+          <a:schemeClr val="bg1"/>
+        </a:solidFill>
+        <a:effectLst/>
+      </p:bgPr>
+    </p:bg>
+    <p:spTree>
+      <p:nvGrpSpPr>
+        <p:cNvPr id="1" name=""/>
+        <p:cNvGrpSpPr/>
+        <p:nvPr/>
+      </p:nvGrpSpPr>
+      <p:grpSpPr>
+        <a:xfrm>
+          <a:off x="0" y="0"/>
+          <a:ext cx="0" cy="0"/>
+          <a:chOff x="0" y="0"/>
+          <a:chExt cx="0" cy="0"/>
+        </a:xfrm>
+      </p:grpSpPr>
+      <p:sp useBgFill="1">
+        <p:nvSpPr>
+          <p:cNvPr id="13" name="Rectangle 12">
+            <a:extLst>
+              <a:ext uri="{FF2B5EF4-FFF2-40B4-BE49-F238E27FC236}">
+                <a16:creationId xmlns:a16="http://schemas.microsoft.com/office/drawing/2014/main" id="{99ED5833-B85B-4103-8A3B-CAB0308E6C15}"/>
+              </a:ext>
+              <a:ext uri="{C183D7F6-B498-43B3-948B-1728B52AA6E4}">
+                <adec:decorative xmlns:adec="http://schemas.microsoft.com/office/drawing/2017/decorative" val="1"/>
+              </a:ext>
+            </a:extLst>
+          </p:cNvPr>
+          <p:cNvSpPr>
+            <a:spLocks noGrp="1" noRot="1" noChangeAspect="1" noMove="1" noResize="1" noEditPoints="1" noAdjustHandles="1" noChangeArrowheads="1" noChangeShapeType="1" noTextEdit="1"/>
+          </p:cNvSpPr>
+          <p:nvPr>
+            <p:extLst>
+              <p:ext uri="{386F3935-93C4-4BCD-93E2-E3B085C9AB24}">
+                <p16:designElem xmlns:p16="http://schemas.microsoft.com/office/powerpoint/2015/main" val="1"/>
+              </p:ext>
+            </p:extLst>
+          </p:nvPr>
+        </p:nvSpPr>
+        <p:spPr>
+          <a:xfrm>
+            <a:off x="-1" y="0"/>
+            <a:ext cx="12188952" cy="6858000"/>
+          </a:xfrm>
+          <a:prstGeom prst="rect">
+            <a:avLst/>
+          </a:prstGeom>
+          <a:ln>
+            <a:noFill/>
+          </a:ln>
+        </p:spPr>
+        <p:style>
+          <a:lnRef idx="2">
+            <a:schemeClr val="accent1">
+              <a:shade val="50000"/>
+            </a:schemeClr>
+          </a:lnRef>
+          <a:fillRef idx="1">
+            <a:schemeClr val="accent1"/>
+          </a:fillRef>
+          <a:effectRef idx="0">
+            <a:schemeClr val="accent1"/>
+          </a:effectRef>
+          <a:fontRef idx="minor">
+            <a:schemeClr val="lt1"/>
+          </a:fontRef>
+        </p:style>
+        <p:txBody>
+          <a:bodyPr rtlCol="0" anchor="ctr"/>
+          <a:lstStyle/>
+          <a:p>
+            <a:pPr algn="ctr"/>
+            <a:endParaRPr lang="en-US"/>
+          </a:p>
+        </p:txBody>
+      </p:sp>
+      <p:pic>
+        <p:nvPicPr>
+          <p:cNvPr id="5" name="Inhaltsplatzhalter 4" descr="Ein Bild, das Text, Screenshot, Diagramm, Reihe enthält.&#10;&#10;Beschreibung automatisch generiert.">
+            <a:extLst>
+              <a:ext uri="{FF2B5EF4-FFF2-40B4-BE49-F238E27FC236}">
+                <a16:creationId xmlns:a16="http://schemas.microsoft.com/office/drawing/2014/main" id="{C4DB9C3A-28DB-F680-C386-88D2BA50ABBB}"/>
+              </a:ext>
+            </a:extLst>
+          </p:cNvPr>
+          <p:cNvPicPr>
+            <a:picLocks noGrp="1" noChangeAspect="1"/>
+          </p:cNvPicPr>
+          <p:nvPr>
+            <p:ph idx="1"/>
+          </p:nvPr>
+        </p:nvPicPr>
+        <p:blipFill>
+          <a:blip r:embed="rId2"/>
+          <a:stretch>
+            <a:fillRect/>
+          </a:stretch>
+        </p:blipFill>
+        <p:spPr>
+          <a:xfrm>
+            <a:off x="386989" y="2957665"/>
+            <a:ext cx="5416750" cy="3346376"/>
+          </a:xfrm>
+          <a:prstGeom prst="rect">
+            <a:avLst/>
+          </a:prstGeom>
+        </p:spPr>
+      </p:pic>
+      <p:pic>
+        <p:nvPicPr>
+          <p:cNvPr id="8" name="Grafik 7" descr="Ein Bild, das Text, Reihe, Screenshot, Diagramm enthält.&#10;&#10;Beschreibung automatisch generiert.">
+            <a:extLst>
+              <a:ext uri="{FF2B5EF4-FFF2-40B4-BE49-F238E27FC236}">
+                <a16:creationId xmlns:a16="http://schemas.microsoft.com/office/drawing/2014/main" id="{3555ED38-2194-590D-CEE8-9FD375BD9248}"/>
+              </a:ext>
+            </a:extLst>
+          </p:cNvPr>
+          <p:cNvPicPr>
+            <a:picLocks noChangeAspect="1"/>
+          </p:cNvPicPr>
+          <p:nvPr/>
+        </p:nvPicPr>
+        <p:blipFill>
+          <a:blip r:embed="rId3"/>
+          <a:stretch>
+            <a:fillRect/>
+          </a:stretch>
+        </p:blipFill>
+        <p:spPr>
+          <a:xfrm>
+            <a:off x="6388260" y="2957665"/>
+            <a:ext cx="5416750" cy="3346376"/>
+          </a:xfrm>
+          <a:prstGeom prst="rect">
+            <a:avLst/>
+          </a:prstGeom>
+        </p:spPr>
+      </p:pic>
+      <p:sp>
+        <p:nvSpPr>
+          <p:cNvPr id="4" name="Foliennummernplatzhalter 3">
+            <a:extLst>
+              <a:ext uri="{FF2B5EF4-FFF2-40B4-BE49-F238E27FC236}">
+                <a16:creationId xmlns:a16="http://schemas.microsoft.com/office/drawing/2014/main" id="{82E4413C-5766-9580-B444-D0658DCDEC3F}"/>
+              </a:ext>
+            </a:extLst>
+          </p:cNvPr>
+          <p:cNvSpPr>
+            <a:spLocks noGrp="1"/>
+          </p:cNvSpPr>
+          <p:nvPr>
+            <p:ph type="sldNum" sz="quarter" idx="12"/>
+          </p:nvPr>
+        </p:nvSpPr>
+        <p:spPr>
+          <a:xfrm>
+            <a:off x="8610600" y="6356350"/>
+            <a:ext cx="2743200" cy="365125"/>
+          </a:xfrm>
+        </p:spPr>
+        <p:txBody>
+          <a:bodyPr vert="horz" lIns="91440" tIns="45720" rIns="91440" bIns="45720" rtlCol="0" anchor="ctr">
+            <a:normAutofit/>
+          </a:bodyPr>
+          <a:lstStyle/>
+          <a:p>
+            <a:pPr>
+              <a:spcAft>
+                <a:spcPts val="600"/>
+              </a:spcAft>
+            </a:pPr>
+            <a:fld id="{6A94DD54-3F72-4946-B88E-01AC62404546}" type="slidenum">
+              <a:rPr lang="en-US" smtClean="0"/>
+              <a:pPr>
+                <a:spcAft>
+                  <a:spcPts val="600"/>
+                </a:spcAft>
+              </a:pPr>
+              <a:t>8</a:t>
+            </a:fld>
+            <a:endParaRPr lang="en-US"/>
+          </a:p>
+        </p:txBody>
+      </p:sp>
+      <p:sp>
+        <p:nvSpPr>
+          <p:cNvPr id="10" name="TextBox 3">
+            <a:extLst>
+              <a:ext uri="{FF2B5EF4-FFF2-40B4-BE49-F238E27FC236}">
+                <a16:creationId xmlns:a16="http://schemas.microsoft.com/office/drawing/2014/main" id="{58F69662-6571-7F51-A62C-3E39CD20CB3B}"/>
+              </a:ext>
+            </a:extLst>
+          </p:cNvPr>
+          <p:cNvSpPr txBox="1"/>
+          <p:nvPr/>
+        </p:nvSpPr>
+        <p:spPr>
+          <a:xfrm>
+            <a:off x="274714" y="336893"/>
+            <a:ext cx="12077020" cy="584775"/>
+          </a:xfrm>
+          <a:prstGeom prst="rect">
+            <a:avLst/>
+          </a:prstGeom>
+          <a:noFill/>
+        </p:spPr>
+        <p:txBody>
+          <a:bodyPr wrap="square" rtlCol="0">
+            <a:spAutoFit/>
+          </a:bodyPr>
+          <a:lstStyle/>
+          <a:p>
+            <a:r>
+              <a:rPr lang="en-GB" sz="3200">
+                <a:solidFill>
+                  <a:srgbClr val="231F20"/>
+                </a:solidFill>
+                <a:latin typeface="Arial" panose="020B0604020202020204" pitchFamily="34" charset="0"/>
+                <a:cs typeface="Arial" panose="020B0604020202020204" pitchFamily="34" charset="0"/>
+              </a:rPr>
+              <a:t>Question c – EDA</a:t>
+            </a:r>
+            <a:endParaRPr lang="en-GB" sz="3200"/>
+          </a:p>
+        </p:txBody>
+      </p:sp>
+      <p:sp>
+        <p:nvSpPr>
+          <p:cNvPr id="11" name="TextBox 3">
+            <a:extLst>
+              <a:ext uri="{FF2B5EF4-FFF2-40B4-BE49-F238E27FC236}">
+                <a16:creationId xmlns:a16="http://schemas.microsoft.com/office/drawing/2014/main" id="{EE9B3275-6AFE-903C-9B23-45A50856A79B}"/>
+              </a:ext>
+            </a:extLst>
+          </p:cNvPr>
+          <p:cNvSpPr txBox="1"/>
+          <p:nvPr/>
+        </p:nvSpPr>
+        <p:spPr>
+          <a:xfrm>
+            <a:off x="1833079" y="2011052"/>
+            <a:ext cx="8916962" cy="461665"/>
+          </a:xfrm>
+          <a:prstGeom prst="rect">
+            <a:avLst/>
+          </a:prstGeom>
+          <a:noFill/>
+        </p:spPr>
+        <p:txBody>
+          <a:bodyPr wrap="square" lIns="91440" tIns="45720" rIns="91440" bIns="45720" rtlCol="0" anchor="t">
+            <a:spAutoFit/>
+          </a:bodyPr>
+          <a:lstStyle/>
+          <a:p>
+            <a:r>
+              <a:rPr lang="en-GB" sz="2400">
+                <a:solidFill>
+                  <a:srgbClr val="231F20"/>
+                </a:solidFill>
+                <a:latin typeface="Arial"/>
+                <a:cs typeface="Arial"/>
+              </a:rPr>
+              <a:t>Pattern by Garden</a:t>
+            </a:r>
+            <a:r>
+              <a:rPr lang="en-GB" sz="2400">
+                <a:solidFill>
+                  <a:srgbClr val="000000"/>
+                </a:solidFill>
+                <a:latin typeface="Calibri"/>
+                <a:cs typeface="Calibri"/>
+              </a:rPr>
+              <a:t> </a:t>
+            </a:r>
+            <a:r>
+              <a:rPr lang="en-GB" sz="2400">
+                <a:solidFill>
+                  <a:srgbClr val="231F20"/>
+                </a:solidFill>
+                <a:latin typeface="Arial"/>
+                <a:cs typeface="Arial"/>
+              </a:rPr>
+              <a:t>            Pattern by Type</a:t>
+            </a:r>
+          </a:p>
+        </p:txBody>
+      </p:sp>
+    </p:spTree>
+    <p:extLst>
+      <p:ext uri="{BB962C8B-B14F-4D97-AF65-F5344CB8AC3E}">
+        <p14:creationId xmlns:p14="http://schemas.microsoft.com/office/powerpoint/2010/main" val="1864710421"/>
+      </p:ext>
+    </p:extLst>
+  </p:cSld>
+  <p:clrMapOvr>
+    <a:masterClrMapping/>
+  </p:clrMapOvr>
+</p:sld>
+</file>
+
+<file path=ppt/slides/slide9.xml><?xml version="1.0" encoding="utf-8"?>
+<p:sld xmlns:a="http://schemas.openxmlformats.org/drawingml/2006/main" xmlns:r="http://schemas.openxmlformats.org/officeDocument/2006/relationships" xmlns:p="http://schemas.openxmlformats.org/presentationml/2006/main">
+  <p:cSld>
+    <p:spTree>
+      <p:nvGrpSpPr>
+        <p:cNvPr id="1" name=""/>
+        <p:cNvGrpSpPr/>
+        <p:nvPr/>
+      </p:nvGrpSpPr>
+      <p:grpSpPr>
+        <a:xfrm>
+          <a:off x="0" y="0"/>
+          <a:ext cx="0" cy="0"/>
+          <a:chOff x="0" y="0"/>
+          <a:chExt cx="0" cy="0"/>
+        </a:xfrm>
+      </p:grpSpPr>
+      <p:sp>
+        <p:nvSpPr>
+          <p:cNvPr id="4" name="TextBox 3">
+            <a:extLst>
+              <a:ext uri="{FF2B5EF4-FFF2-40B4-BE49-F238E27FC236}">
+                <a16:creationId xmlns:a16="http://schemas.microsoft.com/office/drawing/2014/main" id="{C33C1ABC-6DBF-68C2-375E-7D9D853BD9CF}"/>
+              </a:ext>
+            </a:extLst>
+          </p:cNvPr>
+          <p:cNvSpPr txBox="1"/>
+          <p:nvPr/>
+        </p:nvSpPr>
+        <p:spPr>
+          <a:xfrm>
+            <a:off x="274714" y="336893"/>
+            <a:ext cx="12077020" cy="584775"/>
+          </a:xfrm>
+          <a:prstGeom prst="rect">
+            <a:avLst/>
+          </a:prstGeom>
+          <a:noFill/>
+        </p:spPr>
+        <p:txBody>
+          <a:bodyPr wrap="square" rtlCol="0">
+            <a:spAutoFit/>
+          </a:bodyPr>
+          <a:lstStyle/>
+          <a:p>
+            <a:r>
+              <a:rPr lang="en-GB" sz="3200">
                 <a:solidFill>
                   <a:srgbClr val="231F20"/>
                 </a:solidFill>
@@ -7652,7 +8761,7 @@
               </a:rPr>
               <a:t>Question c – PCA. Biplot</a:t>
             </a:r>
-            <a:endParaRPr lang="en-GB" sz="3200" dirty="0"/>
+            <a:endParaRPr lang="en-GB" sz="3200"/>
           </a:p>
         </p:txBody>
       </p:sp>
@@ -7671,13 +8780,13 @@
           <p:nvPr/>
         </p:nvPicPr>
         <p:blipFill>
-          <a:blip r:embed="rId3">
+          <a:blip r:embed="rId4">
             <a:extLst>
               <a:ext uri="{28A0092B-C50C-407E-A947-70E740481C1C}">
                 <a14:useLocalDpi xmlns:a14="http://schemas.microsoft.com/office/drawing/2010/main" val="0"/>
               </a:ext>
               <a:ext uri="{96DAC541-7B7A-43D3-8B79-37D633B846F1}">
-                <asvg:svgBlip xmlns:asvg="http://schemas.microsoft.com/office/drawing/2016/SVG/main" r:embed="rId4"/>
+                <asvg:svgBlip xmlns:asvg="http://schemas.microsoft.com/office/drawing/2016/SVG/main" r:embed="rId5"/>
               </a:ext>
             </a:extLst>
           </a:blip>
@@ -7704,126 +8813,11 @@
   <p:clrMapOvr>
     <a:masterClrMapping/>
   </p:clrMapOvr>
-</p:sld>
-</file>
-
-<file path=ppt/slides/slide8.xml><?xml version="1.0" encoding="utf-8"?>
-<p:sld xmlns:a="http://schemas.openxmlformats.org/drawingml/2006/main" xmlns:r="http://schemas.openxmlformats.org/officeDocument/2006/relationships" xmlns:p="http://schemas.openxmlformats.org/presentationml/2006/main">
-  <p:cSld>
-    <p:spTree>
-      <p:nvGrpSpPr>
-        <p:cNvPr id="1" name=""/>
-        <p:cNvGrpSpPr/>
-        <p:nvPr/>
-      </p:nvGrpSpPr>
-      <p:grpSpPr>
-        <a:xfrm>
-          <a:off x="0" y="0"/>
-          <a:ext cx="0" cy="0"/>
-          <a:chOff x="0" y="0"/>
-          <a:chExt cx="0" cy="0"/>
-        </a:xfrm>
-      </p:grpSpPr>
-      <p:sp>
-        <p:nvSpPr>
-          <p:cNvPr id="4" name="TextBox 3">
-            <a:extLst>
-              <a:ext uri="{FF2B5EF4-FFF2-40B4-BE49-F238E27FC236}">
-                <a16:creationId xmlns:a16="http://schemas.microsoft.com/office/drawing/2014/main" id="{C33C1ABC-6DBF-68C2-375E-7D9D853BD9CF}"/>
-              </a:ext>
-            </a:extLst>
-          </p:cNvPr>
-          <p:cNvSpPr txBox="1"/>
-          <p:nvPr/>
-        </p:nvSpPr>
-        <p:spPr>
-          <a:xfrm>
-            <a:off x="274714" y="336893"/>
-            <a:ext cx="12077020" cy="584775"/>
-          </a:xfrm>
-          <a:prstGeom prst="rect">
-            <a:avLst/>
-          </a:prstGeom>
-          <a:noFill/>
-        </p:spPr>
-        <p:txBody>
-          <a:bodyPr wrap="square" rtlCol="0">
-            <a:spAutoFit/>
-          </a:bodyPr>
-          <a:lstStyle/>
-          <a:p>
-            <a:r>
-              <a:rPr lang="en-GB" sz="3200" dirty="0">
-                <a:solidFill>
-                  <a:srgbClr val="231F20"/>
-                </a:solidFill>
-                <a:latin typeface="Arial" panose="020B0604020202020204" pitchFamily="34" charset="0"/>
-                <a:cs typeface="Arial" panose="020B0604020202020204" pitchFamily="34" charset="0"/>
-              </a:rPr>
-              <a:t>Question c – PCA. </a:t>
-            </a:r>
-            <a:r>
-              <a:rPr lang="en-GB" sz="3200">
-                <a:solidFill>
-                  <a:srgbClr val="231F20"/>
-                </a:solidFill>
-                <a:latin typeface="Arial" panose="020B0604020202020204" pitchFamily="34" charset="0"/>
-                <a:cs typeface="Arial" panose="020B0604020202020204" pitchFamily="34" charset="0"/>
-              </a:rPr>
-              <a:t>Scree plot</a:t>
-            </a:r>
-            <a:endParaRPr lang="en-GB" sz="3200" dirty="0"/>
-          </a:p>
-        </p:txBody>
-      </p:sp>
-      <p:pic>
-        <p:nvPicPr>
-          <p:cNvPr id="7" name="Graphic 6">
-            <a:extLst>
-              <a:ext uri="{FF2B5EF4-FFF2-40B4-BE49-F238E27FC236}">
-                <a16:creationId xmlns:a16="http://schemas.microsoft.com/office/drawing/2014/main" id="{5EECB1C0-0A3C-C9CC-ADF5-50FBE27B6049}"/>
-              </a:ext>
-            </a:extLst>
-          </p:cNvPr>
-          <p:cNvPicPr>
-            <a:picLocks noChangeAspect="1"/>
-          </p:cNvPicPr>
-          <p:nvPr/>
-        </p:nvPicPr>
-        <p:blipFill>
-          <a:blip r:embed="rId3">
-            <a:extLst>
-              <a:ext uri="{28A0092B-C50C-407E-A947-70E740481C1C}">
-                <a14:useLocalDpi xmlns:a14="http://schemas.microsoft.com/office/drawing/2010/main" val="0"/>
-              </a:ext>
-              <a:ext uri="{96DAC541-7B7A-43D3-8B79-37D633B846F1}">
-                <asvg:svgBlip xmlns:asvg="http://schemas.microsoft.com/office/drawing/2016/SVG/main" r:embed="rId4"/>
-              </a:ext>
-            </a:extLst>
-          </a:blip>
-          <a:srcRect/>
-          <a:stretch/>
-        </p:blipFill>
-        <p:spPr>
-          <a:xfrm>
-            <a:off x="1817185" y="1232373"/>
-            <a:ext cx="8557627" cy="5625626"/>
-          </a:xfrm>
-          <a:prstGeom prst="rect">
-            <a:avLst/>
-          </a:prstGeom>
-        </p:spPr>
-      </p:pic>
-    </p:spTree>
-    <p:extLst>
-      <p:ext uri="{BB962C8B-B14F-4D97-AF65-F5344CB8AC3E}">
-        <p14:creationId xmlns:p14="http://schemas.microsoft.com/office/powerpoint/2010/main" val="2024622321"/>
-      </p:ext>
-    </p:extLst>
-  </p:cSld>
-  <p:clrMapOvr>
-    <a:masterClrMapping/>
-  </p:clrMapOvr>
+  <p:extLst>
+    <p:ext uri="{6950BFC3-D8DA-4A85-94F7-54DA5524770B}">
+      <p188:commentRel xmlns:p188="http://schemas.microsoft.com/office/powerpoint/2018/8/main" r:id="rId3"/>
+    </p:ext>
+  </p:extLst>
 </p:sld>
 </file>
 

</xml_diff>